<commit_message>
Update 01 Course Introduction.pptx
</commit_message>
<xml_diff>
--- a/Lecture Slides/01 Course Introduction.pptx
+++ b/Lecture Slides/01 Course Introduction.pptx
@@ -170,14 +170,6 @@
     </p:ext>
   </p:extLst>
 </p:presentation>
-</file>
-
-<file path=ppt/revisionInfo.xml><?xml version="1.0" encoding="utf-8"?>
-<p1510:revInfo xmlns:a="http://schemas.openxmlformats.org/drawingml/2006/main" xmlns:r="http://schemas.openxmlformats.org/officeDocument/2006/relationships" xmlns:p1510="http://schemas.microsoft.com/office/powerpoint/2015/10/main">
-  <p1510:revLst>
-    <p1510:client id="{508481B5-E411-4B4C-A777-641E1D117DE0}" v="3" dt="2024-05-22T18:18:58.055"/>
-  </p1510:revLst>
-</p1510:revInfo>
 </file>
 
 <file path=ppt/changesInfos/changesInfo1.xml><?xml version="1.0" encoding="utf-8"?>
@@ -353,6 +345,69 @@
     </pc:docChg>
   </pc:docChgLst>
   <pc:docChgLst>
+    <pc:chgData name="Raymer, Michael L." userId="96c2fb1d-e79c-4ca3-9876-783e98fdd04a" providerId="ADAL" clId="{69A6AC3C-9FC0-467C-8C5F-425CD7346B5E}"/>
+    <pc:docChg chg="modSld">
+      <pc:chgData name="Raymer, Michael L." userId="96c2fb1d-e79c-4ca3-9876-783e98fdd04a" providerId="ADAL" clId="{69A6AC3C-9FC0-467C-8C5F-425CD7346B5E}" dt="2024-08-26T14:58:17.314" v="126" actId="20577"/>
+      <pc:docMkLst>
+        <pc:docMk/>
+      </pc:docMkLst>
+      <pc:sldChg chg="modSp mod">
+        <pc:chgData name="Raymer, Michael L." userId="96c2fb1d-e79c-4ca3-9876-783e98fdd04a" providerId="ADAL" clId="{69A6AC3C-9FC0-467C-8C5F-425CD7346B5E}" dt="2024-08-26T14:57:47.053" v="111" actId="20577"/>
+        <pc:sldMkLst>
+          <pc:docMk/>
+          <pc:sldMk cId="1510891927" sldId="264"/>
+        </pc:sldMkLst>
+        <pc:graphicFrameChg chg="modGraphic">
+          <ac:chgData name="Raymer, Michael L." userId="96c2fb1d-e79c-4ca3-9876-783e98fdd04a" providerId="ADAL" clId="{69A6AC3C-9FC0-467C-8C5F-425CD7346B5E}" dt="2024-08-26T14:57:47.053" v="111" actId="20577"/>
+          <ac:graphicFrameMkLst>
+            <pc:docMk/>
+            <pc:sldMk cId="1510891927" sldId="264"/>
+            <ac:graphicFrameMk id="5" creationId="{890BD286-9227-B887-AFBA-AC02BFE9520A}"/>
+          </ac:graphicFrameMkLst>
+        </pc:graphicFrameChg>
+      </pc:sldChg>
+      <pc:sldChg chg="modSp mod">
+        <pc:chgData name="Raymer, Michael L." userId="96c2fb1d-e79c-4ca3-9876-783e98fdd04a" providerId="ADAL" clId="{69A6AC3C-9FC0-467C-8C5F-425CD7346B5E}" dt="2024-08-26T14:58:17.314" v="126" actId="20577"/>
+        <pc:sldMkLst>
+          <pc:docMk/>
+          <pc:sldMk cId="886814569" sldId="267"/>
+        </pc:sldMkLst>
+        <pc:spChg chg="mod">
+          <ac:chgData name="Raymer, Michael L." userId="96c2fb1d-e79c-4ca3-9876-783e98fdd04a" providerId="ADAL" clId="{69A6AC3C-9FC0-467C-8C5F-425CD7346B5E}" dt="2024-08-26T14:58:17.314" v="126" actId="20577"/>
+          <ac:spMkLst>
+            <pc:docMk/>
+            <pc:sldMk cId="886814569" sldId="267"/>
+            <ac:spMk id="7" creationId="{6827AD4D-4834-4872-2101-918EFFE0EEB2}"/>
+          </ac:spMkLst>
+        </pc:spChg>
+      </pc:sldChg>
+    </pc:docChg>
+  </pc:docChgLst>
+  <pc:docChgLst>
+    <pc:chgData name="Raymer, Michael L." userId="96c2fb1d-e79c-4ca3-9876-783e98fdd04a" providerId="ADAL" clId="{C35C7575-4792-4DF7-AE35-E7EE41B70EBD}"/>
+    <pc:docChg chg="modSld">
+      <pc:chgData name="Raymer, Michael L." userId="96c2fb1d-e79c-4ca3-9876-783e98fdd04a" providerId="ADAL" clId="{C35C7575-4792-4DF7-AE35-E7EE41B70EBD}" dt="2024-08-28T15:02:09.455" v="62" actId="115"/>
+      <pc:docMkLst>
+        <pc:docMk/>
+      </pc:docMkLst>
+      <pc:sldChg chg="modSp mod">
+        <pc:chgData name="Raymer, Michael L." userId="96c2fb1d-e79c-4ca3-9876-783e98fdd04a" providerId="ADAL" clId="{C35C7575-4792-4DF7-AE35-E7EE41B70EBD}" dt="2024-08-28T15:02:09.455" v="62" actId="115"/>
+        <pc:sldMkLst>
+          <pc:docMk/>
+          <pc:sldMk cId="886814569" sldId="267"/>
+        </pc:sldMkLst>
+        <pc:spChg chg="mod">
+          <ac:chgData name="Raymer, Michael L." userId="96c2fb1d-e79c-4ca3-9876-783e98fdd04a" providerId="ADAL" clId="{C35C7575-4792-4DF7-AE35-E7EE41B70EBD}" dt="2024-08-28T15:02:09.455" v="62" actId="115"/>
+          <ac:spMkLst>
+            <pc:docMk/>
+            <pc:sldMk cId="886814569" sldId="267"/>
+            <ac:spMk id="7" creationId="{6827AD4D-4834-4872-2101-918EFFE0EEB2}"/>
+          </ac:spMkLst>
+        </pc:spChg>
+      </pc:sldChg>
+    </pc:docChg>
+  </pc:docChgLst>
+  <pc:docChgLst>
     <pc:chgData name="Raymer, Michael L." userId="96c2fb1d-e79c-4ca3-9876-783e98fdd04a" providerId="ADAL" clId="{975FD21B-14EB-4356-8F3C-BDD2883AB708}"/>
     <pc:docChg chg="modSld">
       <pc:chgData name="Raymer, Michael L." userId="96c2fb1d-e79c-4ca3-9876-783e98fdd04a" providerId="ADAL" clId="{975FD21B-14EB-4356-8F3C-BDD2883AB708}" dt="2024-05-12T02:57:36.586" v="1" actId="2711"/>
@@ -1501,7 +1556,7 @@
               <a:rPr lang="fr-FR" altLang="en-US"/>
               <a:t>CS 1181 – Computer Science II</a:t>
             </a:r>
-            <a:endParaRPr lang="en-US" altLang="en-US" dirty="0"/>
+            <a:endParaRPr lang="en-US" altLang="en-US"/>
           </a:p>
         </p:txBody>
       </p:sp>
@@ -3255,7 +3310,7 @@
             <a:lstStyle/>
             <a:p>
               <a:r>
-                <a:rPr lang="en-US" sz="700" dirty="0">
+                <a:rPr lang="en-US" sz="700">
                   <a:latin typeface="Univers" panose="020B0503020202020204" pitchFamily="34" charset="0"/>
                 </a:rPr>
                 <a:t>Department of</a:t>
@@ -3263,7 +3318,7 @@
             </a:p>
             <a:p>
               <a:r>
-                <a:rPr lang="en-US" sz="700" b="1" dirty="0">
+                <a:rPr lang="en-US" sz="700" b="1">
                   <a:latin typeface="Univers" panose="020B0503020202020204" pitchFamily="34" charset="0"/>
                 </a:rPr>
                 <a:t>Computer Science</a:t>
@@ -3271,7 +3326,7 @@
             </a:p>
             <a:p>
               <a:r>
-                <a:rPr lang="en-US" sz="700" b="1" dirty="0">
+                <a:rPr lang="en-US" sz="700" b="1">
                   <a:latin typeface="Univers" panose="020B0503020202020204" pitchFamily="34" charset="0"/>
                 </a:rPr>
                 <a:t>and Engineering</a:t>
@@ -3932,7 +3987,7 @@
           <a:p>
             <a:pPr lvl="0"/>
             <a:r>
-              <a:rPr lang="en-US" altLang="en-US" dirty="0"/>
+              <a:rPr lang="en-US" altLang="en-US"/>
               <a:t>Click to edit Master title style</a:t>
             </a:r>
           </a:p>
@@ -4006,35 +4061,35 @@
           <a:p>
             <a:pPr lvl="0"/>
             <a:r>
-              <a:rPr lang="en-US" altLang="en-US" dirty="0"/>
+              <a:rPr lang="en-US" altLang="en-US"/>
               <a:t>Click to edit Master text styles</a:t>
             </a:r>
           </a:p>
           <a:p>
             <a:pPr lvl="1"/>
             <a:r>
-              <a:rPr lang="en-US" altLang="en-US" dirty="0"/>
+              <a:rPr lang="en-US" altLang="en-US"/>
               <a:t>Second level</a:t>
             </a:r>
           </a:p>
           <a:p>
             <a:pPr lvl="2"/>
             <a:r>
-              <a:rPr lang="en-US" altLang="en-US" dirty="0"/>
+              <a:rPr lang="en-US" altLang="en-US"/>
               <a:t>Third level</a:t>
             </a:r>
           </a:p>
           <a:p>
             <a:pPr lvl="3"/>
             <a:r>
-              <a:rPr lang="en-US" altLang="en-US" dirty="0"/>
+              <a:rPr lang="en-US" altLang="en-US"/>
               <a:t>Fourth level</a:t>
             </a:r>
           </a:p>
           <a:p>
             <a:pPr lvl="4"/>
             <a:r>
-              <a:rPr lang="en-US" altLang="en-US" dirty="0"/>
+              <a:rPr lang="en-US" altLang="en-US"/>
               <a:t>Fifth level</a:t>
             </a:r>
           </a:p>
@@ -4114,10 +4169,10 @@
               <a:defRPr/>
             </a:pPr>
             <a:r>
-              <a:rPr lang="fr-FR" altLang="en-US" dirty="0"/>
+              <a:rPr lang="fr-FR" altLang="en-US"/>
               <a:t>CS 1181 – Computer Science II</a:t>
             </a:r>
-            <a:endParaRPr lang="en-US" altLang="en-US" dirty="0"/>
+            <a:endParaRPr lang="en-US" altLang="en-US"/>
           </a:p>
         </p:txBody>
       </p:sp>
@@ -4490,7 +4545,7 @@
             <a:lstStyle/>
             <a:p>
               <a:r>
-                <a:rPr lang="en-US" sz="700" dirty="0">
+                <a:rPr lang="en-US" sz="700">
                   <a:latin typeface="Univers" panose="020B0503020202020204" pitchFamily="34" charset="0"/>
                 </a:rPr>
                 <a:t>Department of</a:t>
@@ -4498,7 +4553,7 @@
             </a:p>
             <a:p>
               <a:r>
-                <a:rPr lang="en-US" sz="700" b="1" dirty="0">
+                <a:rPr lang="en-US" sz="700" b="1">
                   <a:latin typeface="Univers" panose="020B0503020202020204" pitchFamily="34" charset="0"/>
                 </a:rPr>
                 <a:t>Computer Science</a:t>
@@ -4506,7 +4561,7 @@
             </a:p>
             <a:p>
               <a:r>
-                <a:rPr lang="en-US" sz="700" b="1" dirty="0">
+                <a:rPr lang="en-US" sz="700" b="1">
                   <a:latin typeface="Univers" panose="020B0503020202020204" pitchFamily="34" charset="0"/>
                 </a:rPr>
                 <a:t>and Engineering</a:t>
@@ -5019,13 +5074,13 @@
               <a:defRPr/>
             </a:pPr>
             <a:r>
-              <a:rPr lang="en-US" altLang="en-US" sz="4000" dirty="0">
+              <a:rPr lang="en-US" altLang="en-US" sz="4000">
                 <a:latin typeface="Dreaming Outloud Pro" panose="03050502040302030504" pitchFamily="66" charset="0"/>
                 <a:cs typeface="Dreaming Outloud Pro" panose="03050502040302030504" pitchFamily="66" charset="0"/>
               </a:rPr>
               <a:t>Course Introduction</a:t>
             </a:r>
-            <a:endParaRPr lang="en-US" altLang="en-US" sz="3200" dirty="0">
+            <a:endParaRPr lang="en-US" altLang="en-US" sz="3200">
               <a:latin typeface="Dreaming Outloud Pro" panose="03050502040302030504" pitchFamily="66" charset="0"/>
               <a:cs typeface="Dreaming Outloud Pro" panose="03050502040302030504" pitchFamily="66" charset="0"/>
             </a:endParaRPr>
@@ -5098,7 +5153,7 @@
               <a:defRPr/>
             </a:pPr>
             <a:r>
-              <a:rPr lang="en-US" altLang="en-US" sz="3600" i="1" dirty="0">
+              <a:rPr lang="en-US" altLang="en-US" sz="3600" i="1">
                 <a:effectLst>
                   <a:outerShdw blurRad="38100" dist="38100" dir="2700000" algn="tl">
                     <a:srgbClr val="C0C0C0"/>
@@ -5144,7 +5199,7 @@
               <a:defRPr/>
             </a:pPr>
             <a:r>
-              <a:rPr lang="en-US" sz="1400" dirty="0">
+              <a:rPr lang="en-US" sz="1400">
                 <a:latin typeface="Speak Pro" panose="020B0504020101020102" pitchFamily="34" charset="0"/>
               </a:rPr>
               <a:t>Dr. Michael Raymer</a:t>
@@ -5154,7 +5209,7 @@
             <a:pPr algn="ctr" eaLnBrk="1" hangingPunct="1">
               <a:defRPr/>
             </a:pPr>
-            <a:endParaRPr lang="en-US" sz="1050" dirty="0">
+            <a:endParaRPr lang="en-US" sz="1050">
               <a:latin typeface="Speak Pro" panose="020B0504020101020102" pitchFamily="34" charset="0"/>
             </a:endParaRPr>
           </a:p>
@@ -5163,7 +5218,7 @@
               <a:defRPr/>
             </a:pPr>
             <a:r>
-              <a:rPr lang="en-US" sz="1050" dirty="0">
+              <a:rPr lang="en-US" sz="1050">
                 <a:latin typeface="Speak Pro" panose="020B0504020101020102" pitchFamily="34" charset="0"/>
               </a:rPr>
               <a:t>Lecture materials adapted from:</a:t>
@@ -5173,7 +5228,7 @@
             <a:pPr algn="ctr" eaLnBrk="1" hangingPunct="1">
               <a:defRPr/>
             </a:pPr>
-            <a:endParaRPr lang="en-US" altLang="en-US" sz="1050" dirty="0">
+            <a:endParaRPr lang="en-US" altLang="en-US" sz="1050">
               <a:latin typeface="Speak Pro" panose="020B0504020101020102" pitchFamily="34" charset="0"/>
             </a:endParaRPr>
           </a:p>
@@ -5182,53 +5237,53 @@
               <a:defRPr/>
             </a:pPr>
             <a:r>
-              <a:rPr lang="en-US" altLang="en-US" sz="1050" dirty="0">
+              <a:rPr lang="en-US" altLang="en-US" sz="1050">
                 <a:latin typeface="Speak Pro" panose="020B0504020101020102" pitchFamily="34" charset="0"/>
               </a:rPr>
               <a:t>ZyBooks ISBN: 979-8-203-16123-9</a:t>
             </a:r>
             <a:br>
-              <a:rPr lang="en-US" altLang="en-US" sz="1050" dirty="0">
+              <a:rPr lang="en-US" altLang="en-US" sz="1050">
                 <a:latin typeface="Speak Pro" panose="020B0504020101020102" pitchFamily="34" charset="0"/>
               </a:rPr>
             </a:br>
             <a:r>
-              <a:rPr lang="en-US" altLang="en-US" sz="900" dirty="0">
+              <a:rPr lang="en-US" altLang="en-US" sz="900">
                 <a:latin typeface="Speak Pro" panose="020B0504020101020102" pitchFamily="34" charset="0"/>
               </a:rPr>
               <a:t>Dr. Cay </a:t>
             </a:r>
             <a:r>
-              <a:rPr lang="en-US" altLang="en-US" sz="900" dirty="0" err="1">
+              <a:rPr lang="en-US" altLang="en-US" sz="900" err="1">
                 <a:latin typeface="Speak Pro" panose="020B0504020101020102" pitchFamily="34" charset="0"/>
               </a:rPr>
               <a:t>Horstmann</a:t>
             </a:r>
             <a:r>
-              <a:rPr lang="en-US" altLang="en-US" sz="900" dirty="0">
+              <a:rPr lang="en-US" altLang="en-US" sz="900">
                 <a:latin typeface="Speak Pro" panose="020B0504020101020102" pitchFamily="34" charset="0"/>
               </a:rPr>
               <a:t>, Univ. of Michigan</a:t>
             </a:r>
             <a:br>
-              <a:rPr lang="en-US" altLang="en-US" sz="900" dirty="0">
+              <a:rPr lang="en-US" altLang="en-US" sz="900">
                 <a:latin typeface="Speak Pro" panose="020B0504020101020102" pitchFamily="34" charset="0"/>
               </a:rPr>
             </a:br>
             <a:r>
-              <a:rPr lang="en-US" altLang="en-US" sz="900" dirty="0">
+              <a:rPr lang="en-US" altLang="en-US" sz="900">
                 <a:latin typeface="Speak Pro" panose="020B0504020101020102" pitchFamily="34" charset="0"/>
               </a:rPr>
               <a:t>Dr. Roman </a:t>
             </a:r>
             <a:r>
-              <a:rPr lang="en-US" altLang="en-US" sz="900" dirty="0" err="1">
+              <a:rPr lang="en-US" altLang="en-US" sz="900" err="1">
                 <a:latin typeface="Speak Pro" panose="020B0504020101020102" pitchFamily="34" charset="0"/>
               </a:rPr>
               <a:t>Lysecky</a:t>
             </a:r>
             <a:r>
-              <a:rPr lang="en-US" altLang="en-US" sz="900" dirty="0">
+              <a:rPr lang="en-US" altLang="en-US" sz="900">
                 <a:latin typeface="Speak Pro" panose="020B0504020101020102" pitchFamily="34" charset="0"/>
               </a:rPr>
               <a:t>, Univ. of Arizona</a:t>
@@ -5239,7 +5294,7 @@
               <a:defRPr/>
             </a:pPr>
             <a:r>
-              <a:rPr lang="en-US" altLang="en-US" sz="900" dirty="0">
+              <a:rPr lang="en-US" altLang="en-US" sz="900">
                 <a:latin typeface="Speak Pro" panose="020B0504020101020102" pitchFamily="34" charset="0"/>
               </a:rPr>
               <a:t>Dr. Adrian Lizarraga, Univ. of Arizona</a:t>
@@ -5249,7 +5304,7 @@
             <a:pPr algn="ctr" eaLnBrk="1" hangingPunct="1">
               <a:defRPr/>
             </a:pPr>
-            <a:endParaRPr lang="en-US" altLang="en-US" sz="1050" dirty="0">
+            <a:endParaRPr lang="en-US" altLang="en-US" sz="1050">
               <a:latin typeface="Speak Pro" panose="020B0504020101020102" pitchFamily="34" charset="0"/>
             </a:endParaRPr>
           </a:p>
@@ -5258,7 +5313,7 @@
               <a:defRPr/>
             </a:pPr>
             <a:r>
-              <a:rPr lang="en-US" altLang="en-US" sz="900" dirty="0">
+              <a:rPr lang="en-US" altLang="en-US" sz="900">
                 <a:latin typeface="Speak Pro" panose="020B0504020101020102" pitchFamily="34" charset="0"/>
               </a:rPr>
               <a:t>Dr. Travis Doom</a:t>
@@ -5268,7 +5323,7 @@
             <a:pPr algn="ctr" eaLnBrk="1" hangingPunct="1">
               <a:defRPr/>
             </a:pPr>
-            <a:endParaRPr lang="en-US" altLang="en-US" sz="900" dirty="0">
+            <a:endParaRPr lang="en-US" altLang="en-US" sz="900">
               <a:latin typeface="Speak Pro" panose="020B0504020101020102" pitchFamily="34" charset="0"/>
             </a:endParaRPr>
           </a:p>
@@ -5277,7 +5332,7 @@
               <a:defRPr/>
             </a:pPr>
             <a:r>
-              <a:rPr lang="en-US" altLang="en-US" sz="900" dirty="0">
+              <a:rPr lang="en-US" altLang="en-US" sz="900">
                 <a:latin typeface="Speak Pro" panose="020B0504020101020102" pitchFamily="34" charset="0"/>
               </a:rPr>
               <a:t>Dr. Michelle Cheatham</a:t>
@@ -5287,7 +5342,7 @@
             <a:pPr algn="ctr" eaLnBrk="1" hangingPunct="1">
               <a:defRPr/>
             </a:pPr>
-            <a:endParaRPr lang="en-US" altLang="en-US" sz="900" dirty="0">
+            <a:endParaRPr lang="en-US" altLang="en-US" sz="900">
               <a:latin typeface="Speak Pro" panose="020B0504020101020102" pitchFamily="34" charset="0"/>
             </a:endParaRPr>
           </a:p>
@@ -5296,7 +5351,7 @@
               <a:defRPr/>
             </a:pPr>
             <a:r>
-              <a:rPr lang="en-US" altLang="en-US" sz="900" dirty="0">
+              <a:rPr lang="en-US" altLang="en-US" sz="900">
                 <a:latin typeface="Speak Pro" panose="020B0504020101020102" pitchFamily="34" charset="0"/>
               </a:rPr>
               <a:t>Unless otherwise noted images are used under the creative commons license or used under license from Adobe Stock.</a:t>
@@ -5440,7 +5495,7 @@
             <a:lstStyle/>
             <a:p>
               <a:r>
-                <a:rPr lang="en-US" sz="4400" dirty="0">
+                <a:rPr lang="en-US" sz="4400">
                   <a:effectLst>
                     <a:outerShdw blurRad="38100" dist="38100" dir="2700000" algn="tl">
                       <a:srgbClr val="000000">
@@ -5490,7 +5545,7 @@
                 </a:spcAft>
               </a:pPr>
               <a:r>
-                <a:rPr lang="en-US" sz="2800" dirty="0">
+                <a:rPr lang="en-US" sz="2800">
                   <a:effectLst>
                     <a:outerShdw blurRad="38100" dist="38100" dir="2700000" algn="tl">
                       <a:srgbClr val="000000">
@@ -5511,7 +5566,7 @@
                 </a:spcAft>
               </a:pPr>
               <a:r>
-                <a:rPr lang="en-US" sz="2800" dirty="0">
+                <a:rPr lang="en-US" sz="2800">
                   <a:effectLst>
                     <a:outerShdw blurRad="38100" dist="38100" dir="2700000" algn="tl">
                       <a:srgbClr val="000000">
@@ -5532,7 +5587,7 @@
                 </a:spcAft>
               </a:pPr>
               <a:r>
-                <a:rPr lang="en-US" sz="2800" dirty="0">
+                <a:rPr lang="en-US" sz="2800">
                   <a:effectLst>
                     <a:outerShdw blurRad="38100" dist="38100" dir="2700000" algn="tl">
                       <a:srgbClr val="000000">
@@ -5553,7 +5608,7 @@
                 </a:spcAft>
               </a:pPr>
               <a:r>
-                <a:rPr lang="en-US" sz="2800" dirty="0">
+                <a:rPr lang="en-US" sz="2800">
                   <a:effectLst>
                     <a:outerShdw blurRad="38100" dist="38100" dir="2700000" algn="tl">
                       <a:srgbClr val="000000">
@@ -5567,7 +5622,7 @@
                 <a:t>Two quizzes dropped, no re-takes except for </a:t>
               </a:r>
               <a:r>
-                <a:rPr lang="en-US" sz="2800" u="sng" dirty="0">
+                <a:rPr lang="en-US" sz="2800" u="sng">
                   <a:effectLst>
                     <a:outerShdw blurRad="38100" dist="38100" dir="2700000" algn="tl">
                       <a:srgbClr val="000000">
@@ -5581,7 +5636,7 @@
                 <a:t>documented</a:t>
               </a:r>
               <a:r>
-                <a:rPr lang="en-US" sz="2800" dirty="0">
+                <a:rPr lang="en-US" sz="2800">
                   <a:effectLst>
                     <a:outerShdw blurRad="38100" dist="38100" dir="2700000" algn="tl">
                       <a:srgbClr val="000000">
@@ -5705,9 +5760,9 @@
         <p:grpSpPr>
           <a:xfrm>
             <a:off x="752819" y="358170"/>
-            <a:ext cx="7781581" cy="4823162"/>
+            <a:ext cx="7781581" cy="4946273"/>
             <a:chOff x="1513759" y="990600"/>
-            <a:chExt cx="7781581" cy="4823162"/>
+            <a:chExt cx="7781581" cy="4946273"/>
           </a:xfrm>
         </p:grpSpPr>
         <p:sp>
@@ -5739,7 +5794,7 @@
             <a:lstStyle/>
             <a:p>
               <a:r>
-                <a:rPr lang="en-US" sz="4400" dirty="0">
+                <a:rPr lang="en-US" sz="4400">
                   <a:effectLst>
                     <a:outerShdw blurRad="38100" dist="38100" dir="2700000" algn="tl">
                       <a:srgbClr val="000000">
@@ -5770,7 +5825,7 @@
           <p:spPr>
             <a:xfrm>
               <a:off x="1732921" y="1905000"/>
-              <a:ext cx="7562419" cy="3908762"/>
+              <a:ext cx="7562419" cy="4031873"/>
             </a:xfrm>
             <a:prstGeom prst="rect">
               <a:avLst/>
@@ -5810,7 +5865,7 @@
                 </a:spcAft>
               </a:pPr>
               <a:r>
-                <a:rPr lang="en-US" sz="2800" dirty="0">
+                <a:rPr lang="en-US" sz="2800" dirty="0" err="1">
                   <a:effectLst>
                     <a:outerShdw blurRad="38100" dist="38100" dir="2700000" algn="tl">
                       <a:srgbClr val="000000">
@@ -5823,6 +5878,17 @@
                 </a:rPr>
                 <a:t>ZyBooks</a:t>
               </a:r>
+              <a:endParaRPr lang="en-US" sz="2800" dirty="0">
+                <a:effectLst>
+                  <a:outerShdw blurRad="38100" dist="38100" dir="2700000" algn="tl">
+                    <a:srgbClr val="000000">
+                      <a:alpha val="43137"/>
+                    </a:srgbClr>
+                  </a:outerShdw>
+                </a:effectLst>
+                <a:latin typeface="Dreaming Outloud Pro" panose="020F0502020204030204" pitchFamily="66" charset="0"/>
+                <a:cs typeface="Dreaming Outloud Pro" panose="020F0502020204030204" pitchFamily="66" charset="0"/>
+              </a:endParaRPr>
             </a:p>
             <a:p>
               <a:pPr>
@@ -5831,7 +5897,7 @@
                 </a:spcAft>
               </a:pPr>
               <a:r>
-                <a:rPr lang="en-US" sz="2800" dirty="0">
+                <a:rPr lang="en-US" sz="2800" strike="sngStrike" dirty="0">
                   <a:effectLst>
                     <a:outerShdw blurRad="38100" dist="38100" dir="2700000" algn="tl">
                       <a:srgbClr val="000000">
@@ -5844,6 +5910,38 @@
                 </a:rPr>
                 <a:t>OneNote</a:t>
               </a:r>
+            </a:p>
+            <a:p>
+              <a:pPr>
+                <a:spcAft>
+                  <a:spcPts val="1200"/>
+                </a:spcAft>
+              </a:pPr>
+              <a:r>
+                <a:rPr lang="en-US" sz="2800" dirty="0" err="1">
+                  <a:effectLst>
+                    <a:outerShdw blurRad="38100" dist="38100" dir="2700000" algn="tl">
+                      <a:srgbClr val="000000">
+                        <a:alpha val="43137"/>
+                      </a:srgbClr>
+                    </a:outerShdw>
+                  </a:effectLst>
+                  <a:latin typeface="Dreaming Outloud Pro" panose="020F0502020204030204" pitchFamily="66" charset="0"/>
+                  <a:cs typeface="Dreaming Outloud Pro" panose="020F0502020204030204" pitchFamily="66" charset="0"/>
+                </a:rPr>
+                <a:t>Github</a:t>
+              </a:r>
+              <a:endParaRPr lang="en-US" sz="2800" dirty="0">
+                <a:effectLst>
+                  <a:outerShdw blurRad="38100" dist="38100" dir="2700000" algn="tl">
+                    <a:srgbClr val="000000">
+                      <a:alpha val="43137"/>
+                    </a:srgbClr>
+                  </a:outerShdw>
+                </a:effectLst>
+                <a:latin typeface="Dreaming Outloud Pro" panose="020F0502020204030204" pitchFamily="66" charset="0"/>
+                <a:cs typeface="Dreaming Outloud Pro" panose="020F0502020204030204" pitchFamily="66" charset="0"/>
+              </a:endParaRPr>
             </a:p>
             <a:p>
               <a:pPr>
@@ -5888,16 +5986,13 @@
               </a:r>
             </a:p>
             <a:p>
-              <a:pPr algn="ctr">
+              <a:pPr>
                 <a:spcAft>
                   <a:spcPts val="1200"/>
                 </a:spcAft>
               </a:pPr>
               <a:r>
-                <a:rPr lang="x-none" sz="2000" b="1" dirty="0">
-                  <a:solidFill>
-                    <a:srgbClr val="0070C0"/>
-                  </a:solidFill>
+                <a:rPr lang="en-US" sz="2800" dirty="0">
                   <a:effectLst>
                     <a:outerShdw blurRad="38100" dist="38100" dir="2700000" algn="tl">
                       <a:srgbClr val="000000">
@@ -5905,48 +6000,53 @@
                       </a:srgbClr>
                     </a:outerShdw>
                   </a:effectLst>
-                  <a:latin typeface="Speak Pro" panose="020B0504020101020102" pitchFamily="34" charset="0"/>
-                  <a:hlinkClick r:id="rId2">
-                    <a:extLst>
-                      <a:ext uri="{A12FA001-AC4F-418D-AE19-62706E023703}">
-                        <ahyp:hlinkClr xmlns:ahyp="http://schemas.microsoft.com/office/drawing/2018/hyperlinkcolor" val="tx"/>
-                      </a:ext>
-                    </a:extLst>
-                  </a:hlinkClick>
+                  <a:latin typeface="Dreaming Outloud Pro" panose="020F0502020204030204" pitchFamily="66" charset="0"/>
+                  <a:cs typeface="Dreaming Outloud Pro" panose="020F0502020204030204" pitchFamily="66" charset="0"/>
                 </a:rPr>
-                <a:t>https://github.com/pattonsgirl/CS1180/tree/main#environment-setup</a:t>
+                <a:t>    See </a:t>
               </a:r>
-              <a:endParaRPr lang="x-none" sz="2000" b="1" dirty="0">
-                <a:solidFill>
-                  <a:srgbClr val="0070C0"/>
-                </a:solidFill>
-                <a:effectLst>
-                  <a:outerShdw blurRad="38100" dist="38100" dir="2700000" algn="tl">
-                    <a:srgbClr val="000000">
-                      <a:alpha val="43137"/>
-                    </a:srgbClr>
-                  </a:outerShdw>
-                </a:effectLst>
-                <a:latin typeface="Speak Pro" panose="020B0504020101020102" pitchFamily="34" charset="0"/>
-              </a:endParaRPr>
-            </a:p>
-            <a:p>
-              <a:pPr>
-                <a:spcAft>
-                  <a:spcPts val="1200"/>
-                </a:spcAft>
-              </a:pPr>
-              <a:endParaRPr lang="en-US" sz="2800" dirty="0">
-                <a:effectLst>
-                  <a:outerShdw blurRad="38100" dist="38100" dir="2700000" algn="tl">
-                    <a:srgbClr val="000000">
-                      <a:alpha val="43137"/>
-                    </a:srgbClr>
-                  </a:outerShdw>
-                </a:effectLst>
-                <a:latin typeface="Dreaming Outloud Pro" panose="020F0502020204030204" pitchFamily="66" charset="0"/>
-                <a:cs typeface="Dreaming Outloud Pro" panose="020F0502020204030204" pitchFamily="66" charset="0"/>
-              </a:endParaRPr>
+              <a:r>
+                <a:rPr lang="en-US" sz="2800" u="sng" dirty="0">
+                  <a:effectLst>
+                    <a:outerShdw blurRad="38100" dist="38100" dir="2700000" algn="tl">
+                      <a:srgbClr val="000000">
+                        <a:alpha val="43137"/>
+                      </a:srgbClr>
+                    </a:outerShdw>
+                  </a:effectLst>
+                  <a:latin typeface="Dreaming Outloud Pro" panose="020F0502020204030204" pitchFamily="66" charset="0"/>
+                  <a:cs typeface="Dreaming Outloud Pro" panose="020F0502020204030204" pitchFamily="66" charset="0"/>
+                </a:rPr>
+                <a:t>Content/VS Code/</a:t>
+              </a:r>
+              <a:r>
+                <a:rPr lang="en-US" sz="2800" u="sng" dirty="0" err="1">
+                  <a:effectLst>
+                    <a:outerShdw blurRad="38100" dist="38100" dir="2700000" algn="tl">
+                      <a:srgbClr val="000000">
+                        <a:alpha val="43137"/>
+                      </a:srgbClr>
+                    </a:outerShdw>
+                  </a:effectLst>
+                  <a:latin typeface="Dreaming Outloud Pro" panose="020F0502020204030204" pitchFamily="66" charset="0"/>
+                  <a:cs typeface="Dreaming Outloud Pro" panose="020F0502020204030204" pitchFamily="66" charset="0"/>
+                </a:rPr>
+                <a:t>InstallGuide</a:t>
+              </a:r>
+              <a:r>
+                <a:rPr lang="en-US" sz="2800" dirty="0">
+                  <a:effectLst>
+                    <a:outerShdw blurRad="38100" dist="38100" dir="2700000" algn="tl">
+                      <a:srgbClr val="000000">
+                        <a:alpha val="43137"/>
+                      </a:srgbClr>
+                    </a:outerShdw>
+                  </a:effectLst>
+                  <a:latin typeface="Dreaming Outloud Pro" panose="020F0502020204030204" pitchFamily="66" charset="0"/>
+                  <a:cs typeface="Dreaming Outloud Pro" panose="020F0502020204030204" pitchFamily="66" charset="0"/>
+                </a:rPr>
+                <a:t> in Pilot</a:t>
+              </a:r>
             </a:p>
           </p:txBody>
         </p:sp>
@@ -6092,7 +6192,7 @@
             <a:lstStyle/>
             <a:p>
               <a:r>
-                <a:rPr lang="en-US" sz="4400" dirty="0">
+                <a:rPr lang="en-US" sz="4400">
                   <a:effectLst>
                     <a:outerShdw blurRad="38100" dist="38100" dir="2700000" algn="tl">
                       <a:srgbClr val="000000">
@@ -6142,7 +6242,7 @@
                 </a:spcAft>
               </a:pPr>
               <a:r>
-                <a:rPr lang="en-US" sz="2800" dirty="0">
+                <a:rPr lang="en-US" sz="2800">
                   <a:effectLst>
                     <a:outerShdw blurRad="38100" dist="38100" dir="2700000" algn="tl">
                       <a:srgbClr val="000000">
@@ -6163,7 +6263,7 @@
                 </a:spcAft>
               </a:pPr>
               <a:r>
-                <a:rPr lang="en-US" sz="2800" dirty="0">
+                <a:rPr lang="en-US" sz="2800">
                   <a:effectLst>
                     <a:outerShdw blurRad="38100" dist="38100" dir="2700000" algn="tl">
                       <a:srgbClr val="000000">
@@ -6184,7 +6284,7 @@
                 </a:spcAft>
               </a:pPr>
               <a:r>
-                <a:rPr lang="en-US" sz="1400" b="1" dirty="0">
+                <a:rPr lang="en-US" sz="1400" b="1">
                   <a:solidFill>
                     <a:srgbClr val="0070C0"/>
                   </a:solidFill>
@@ -6206,7 +6306,7 @@
                 </a:rPr>
                 <a:t>https://engineering-computer-science.wright.edu/computer-science-and-engineering/help-room</a:t>
               </a:r>
-              <a:endParaRPr lang="en-US" sz="1400" b="1" dirty="0">
+              <a:endParaRPr lang="en-US" sz="1400" b="1">
                 <a:solidFill>
                   <a:srgbClr val="0070C0"/>
                 </a:solidFill>
@@ -6227,7 +6327,7 @@
                 </a:spcAft>
               </a:pPr>
               <a:r>
-                <a:rPr lang="en-US" sz="2800" dirty="0">
+                <a:rPr lang="en-US" sz="2800">
                   <a:effectLst>
                     <a:outerShdw blurRad="38100" dist="38100" dir="2700000" algn="tl">
                       <a:srgbClr val="000000">
@@ -6248,7 +6348,7 @@
                 </a:spcAft>
               </a:pPr>
               <a:r>
-                <a:rPr lang="en-US" sz="2800" dirty="0">
+                <a:rPr lang="en-US" sz="2800">
                   <a:effectLst>
                     <a:outerShdw blurRad="38100" dist="38100" dir="2700000" algn="tl">
                       <a:srgbClr val="000000">
@@ -6262,7 +6362,7 @@
                 <a:t>Make an appointment with me –     </a:t>
               </a:r>
               <a:br>
-                <a:rPr lang="en-US" sz="2800" dirty="0">
+                <a:rPr lang="en-US" sz="2800">
                   <a:effectLst>
                     <a:outerShdw blurRad="38100" dist="38100" dir="2700000" algn="tl">
                       <a:srgbClr val="000000">
@@ -6275,7 +6375,7 @@
                 </a:rPr>
               </a:br>
               <a:r>
-                <a:rPr lang="en-US" sz="2800" dirty="0">
+                <a:rPr lang="en-US" sz="2800">
                   <a:effectLst>
                     <a:outerShdw blurRad="38100" dist="38100" dir="2700000" algn="tl">
                       <a:srgbClr val="000000">
@@ -6289,7 +6389,7 @@
                 <a:t>     </a:t>
               </a:r>
               <a:r>
-                <a:rPr lang="en-US" sz="2800" dirty="0">
+                <a:rPr lang="en-US" sz="2800">
                   <a:solidFill>
                     <a:srgbClr val="002060"/>
                   </a:solidFill>
@@ -6313,7 +6413,7 @@
                 </a:spcAft>
               </a:pPr>
               <a:r>
-                <a:rPr lang="en-US" sz="2800" dirty="0">
+                <a:rPr lang="en-US" sz="2800">
                   <a:effectLst>
                     <a:outerShdw blurRad="38100" dist="38100" dir="2700000" algn="tl">
                       <a:srgbClr val="000000">
@@ -6510,7 +6610,7 @@
             <a:lstStyle/>
             <a:p>
               <a:r>
-                <a:rPr lang="en-US" sz="4400" dirty="0">
+                <a:rPr lang="en-US" sz="4400">
                   <a:effectLst>
                     <a:outerShdw blurRad="38100" dist="38100" dir="2700000" algn="tl">
                       <a:srgbClr val="000000">
@@ -6560,7 +6660,7 @@
                 </a:spcAft>
               </a:pPr>
               <a:r>
-                <a:rPr lang="en-US" sz="2800" dirty="0">
+                <a:rPr lang="en-US" sz="2800">
                   <a:effectLst>
                     <a:outerShdw blurRad="38100" dist="38100" dir="2700000" algn="tl">
                       <a:srgbClr val="000000">
@@ -6581,7 +6681,7 @@
                 </a:spcAft>
               </a:pPr>
               <a:r>
-                <a:rPr lang="en-US" sz="2800" dirty="0">
+                <a:rPr lang="en-US" sz="2800">
                   <a:effectLst>
                     <a:outerShdw blurRad="38100" dist="38100" dir="2700000" algn="tl">
                       <a:srgbClr val="000000">
@@ -6602,7 +6702,7 @@
                 </a:spcAft>
               </a:pPr>
               <a:r>
-                <a:rPr lang="en-US" sz="2800" dirty="0">
+                <a:rPr lang="en-US" sz="2800">
                   <a:effectLst>
                     <a:outerShdw blurRad="38100" dist="38100" dir="2700000" algn="tl">
                       <a:srgbClr val="000000">
@@ -6623,7 +6723,7 @@
                 </a:spcAft>
               </a:pPr>
               <a:r>
-                <a:rPr lang="en-US" sz="2800" dirty="0">
+                <a:rPr lang="en-US" sz="2800">
                   <a:effectLst>
                     <a:outerShdw blurRad="38100" dist="38100" dir="2700000" algn="tl">
                       <a:srgbClr val="000000">
@@ -6644,7 +6744,7 @@
                 </a:spcAft>
               </a:pPr>
               <a:r>
-                <a:rPr lang="en-US" sz="2800" dirty="0">
+                <a:rPr lang="en-US" sz="2800">
                   <a:effectLst>
                     <a:outerShdw blurRad="38100" dist="38100" dir="2700000" algn="tl">
                       <a:srgbClr val="000000">
@@ -6802,7 +6902,7 @@
             <a:lstStyle/>
             <a:p>
               <a:r>
-                <a:rPr lang="en-US" sz="4400" dirty="0">
+                <a:rPr lang="en-US" sz="4400">
                   <a:effectLst>
                     <a:outerShdw blurRad="38100" dist="38100" dir="2700000" algn="tl">
                       <a:srgbClr val="000000">
@@ -6852,7 +6952,7 @@
                 </a:spcAft>
               </a:pPr>
               <a:r>
-                <a:rPr lang="en-US" sz="2800" dirty="0">
+                <a:rPr lang="en-US" sz="2800">
                   <a:effectLst>
                     <a:outerShdw blurRad="38100" dist="38100" dir="2700000" algn="tl">
                       <a:srgbClr val="000000">
@@ -6865,7 +6965,7 @@
                 </a:rPr>
                 <a:t>Stuff I like</a:t>
               </a:r>
-              <a:endParaRPr lang="x-none" sz="2000" dirty="0">
+              <a:endParaRPr lang="x-none" sz="2000">
                 <a:solidFill>
                   <a:srgbClr val="0070C0"/>
                 </a:solidFill>
@@ -6877,7 +6977,7 @@
                   <a:spcPts val="1200"/>
                 </a:spcAft>
               </a:pPr>
-              <a:endParaRPr lang="en-US" sz="2800" dirty="0">
+              <a:endParaRPr lang="en-US" sz="2800">
                 <a:effectLst>
                   <a:outerShdw blurRad="38100" dist="38100" dir="2700000" algn="tl">
                     <a:srgbClr val="000000">
@@ -7261,7 +7361,7 @@
           <a:lstStyle/>
           <a:p>
             <a:r>
-              <a:rPr lang="en-US" sz="4400" dirty="0">
+              <a:rPr lang="en-US" sz="4400">
                 <a:effectLst>
                   <a:outerShdw blurRad="38100" dist="38100" dir="2700000" algn="tl">
                     <a:srgbClr val="000000">
@@ -7306,7 +7406,7 @@
           <a:lstStyle/>
           <a:p>
             <a:r>
-              <a:rPr lang="en-US" sz="4400" dirty="0">
+              <a:rPr lang="en-US" sz="4400">
                 <a:effectLst>
                   <a:outerShdw blurRad="38100" dist="38100" dir="2700000" algn="tl">
                     <a:srgbClr val="000000">
@@ -7463,7 +7563,7 @@
             <a:lstStyle/>
             <a:p>
               <a:r>
-                <a:rPr lang="en-US" sz="4400" dirty="0">
+                <a:rPr lang="en-US" sz="4400">
                   <a:effectLst>
                     <a:outerShdw blurRad="38100" dist="38100" dir="2700000" algn="tl">
                       <a:srgbClr val="000000">
@@ -7477,7 +7577,7 @@
                 <a:t>This </a:t>
               </a:r>
               <a:r>
-                <a:rPr lang="en-US" sz="4400" b="1" dirty="0">
+                <a:rPr lang="en-US" sz="4400" b="1">
                   <a:effectLst>
                     <a:outerShdw blurRad="38100" dist="38100" dir="2700000" algn="tl">
                       <a:srgbClr val="000000">
@@ -7491,7 +7591,7 @@
                 <a:t>is not </a:t>
               </a:r>
               <a:r>
-                <a:rPr lang="en-US" sz="4400" dirty="0">
+                <a:rPr lang="en-US" sz="4400">
                   <a:effectLst>
                     <a:outerShdw blurRad="38100" dist="38100" dir="2700000" algn="tl">
                       <a:srgbClr val="000000">
@@ -7536,7 +7636,7 @@
             <a:lstStyle/>
             <a:p>
               <a:r>
-                <a:rPr lang="en-US" sz="2800" dirty="0">
+                <a:rPr lang="en-US" sz="2800">
                   <a:effectLst>
                     <a:outerShdw blurRad="38100" dist="38100" dir="2700000" algn="tl">
                       <a:srgbClr val="000000">
@@ -7602,7 +7702,7 @@
             <a:lstStyle/>
             <a:p>
               <a:r>
-                <a:rPr lang="en-US" sz="4400" dirty="0">
+                <a:rPr lang="en-US" sz="4400">
                   <a:effectLst>
                     <a:outerShdw blurRad="38100" dist="38100" dir="2700000" algn="tl">
                       <a:srgbClr val="000000">
@@ -7616,7 +7716,7 @@
                 <a:t>This </a:t>
               </a:r>
               <a:r>
-                <a:rPr lang="en-US" sz="4400" b="1" dirty="0">
+                <a:rPr lang="en-US" sz="4400" b="1">
                   <a:effectLst>
                     <a:outerShdw blurRad="38100" dist="38100" dir="2700000" algn="tl">
                       <a:srgbClr val="000000">
@@ -7630,7 +7730,7 @@
                 <a:t>is not </a:t>
               </a:r>
               <a:r>
-                <a:rPr lang="en-US" sz="4400" dirty="0">
+                <a:rPr lang="en-US" sz="4400">
                   <a:effectLst>
                     <a:outerShdw blurRad="38100" dist="38100" dir="2700000" algn="tl">
                       <a:srgbClr val="000000">
@@ -7675,7 +7775,7 @@
             <a:lstStyle/>
             <a:p>
               <a:r>
-                <a:rPr lang="en-US" sz="2800" dirty="0">
+                <a:rPr lang="en-US" sz="2800">
                   <a:effectLst>
                     <a:outerShdw blurRad="38100" dist="38100" dir="2700000" algn="tl">
                       <a:srgbClr val="000000">
@@ -7741,7 +7841,7 @@
             <a:lstStyle/>
             <a:p>
               <a:r>
-                <a:rPr lang="en-US" sz="4400" dirty="0">
+                <a:rPr lang="en-US" sz="4400">
                   <a:effectLst>
                     <a:outerShdw blurRad="38100" dist="38100" dir="2700000" algn="tl">
                       <a:srgbClr val="000000">
@@ -7755,7 +7855,7 @@
                 <a:t>This is a </a:t>
               </a:r>
               <a:r>
-                <a:rPr lang="en-US" sz="4400" b="1" dirty="0">
+                <a:rPr lang="en-US" sz="4400" b="1">
                   <a:effectLst>
                     <a:outerShdw blurRad="38100" dist="38100" dir="2700000" algn="tl">
                       <a:srgbClr val="000000">
@@ -7769,7 +7869,7 @@
                 <a:t>computer science </a:t>
               </a:r>
               <a:r>
-                <a:rPr lang="en-US" sz="4400" dirty="0">
+                <a:rPr lang="en-US" sz="4400">
                   <a:effectLst>
                     <a:outerShdw blurRad="38100" dist="38100" dir="2700000" algn="tl">
                       <a:srgbClr val="000000">
@@ -7814,7 +7914,7 @@
             <a:lstStyle/>
             <a:p>
               <a:r>
-                <a:rPr lang="en-US" sz="2800" dirty="0">
+                <a:rPr lang="en-US" sz="2800">
                   <a:effectLst>
                     <a:outerShdw blurRad="38100" dist="38100" dir="2700000" algn="tl">
                       <a:srgbClr val="000000">
@@ -7972,7 +8072,7 @@
             <a:lstStyle/>
             <a:p>
               <a:r>
-                <a:rPr lang="en-US" sz="4400" dirty="0">
+                <a:rPr lang="en-US" sz="4400">
                   <a:effectLst>
                     <a:outerShdw blurRad="38100" dist="38100" dir="2700000" algn="tl">
                       <a:srgbClr val="000000">
@@ -7986,7 +8086,7 @@
                 <a:t>This course is </a:t>
               </a:r>
               <a:r>
-                <a:rPr lang="en-US" sz="4400" b="1" dirty="0">
+                <a:rPr lang="en-US" sz="4400" b="1">
                   <a:effectLst>
                     <a:outerShdw blurRad="38100" dist="38100" dir="2700000" algn="tl">
                       <a:srgbClr val="000000">
@@ -7999,7 +8099,7 @@
                 </a:rPr>
                 <a:t>immersive</a:t>
               </a:r>
-              <a:endParaRPr lang="en-US" sz="4400" dirty="0">
+              <a:endParaRPr lang="en-US" sz="4400">
                 <a:effectLst>
                   <a:outerShdw blurRad="38100" dist="38100" dir="2700000" algn="tl">
                     <a:srgbClr val="000000">
@@ -8047,7 +8147,7 @@
                 </a:spcAft>
               </a:pPr>
               <a:r>
-                <a:rPr lang="en-US" sz="2800" dirty="0">
+                <a:rPr lang="en-US" sz="2800">
                   <a:effectLst>
                     <a:outerShdw blurRad="38100" dist="38100" dir="2700000" algn="tl">
                       <a:srgbClr val="000000">
@@ -8068,7 +8168,7 @@
                 </a:spcAft>
               </a:pPr>
               <a:r>
-                <a:rPr lang="en-US" sz="2800" dirty="0">
+                <a:rPr lang="en-US" sz="2800">
                   <a:effectLst>
                     <a:outerShdw blurRad="38100" dist="38100" dir="2700000" algn="tl">
                       <a:srgbClr val="000000">
@@ -8089,7 +8189,7 @@
                 </a:spcAft>
               </a:pPr>
               <a:r>
-                <a:rPr lang="en-US" sz="2800" dirty="0">
+                <a:rPr lang="en-US" sz="2800">
                   <a:effectLst>
                     <a:outerShdw blurRad="38100" dist="38100" dir="2700000" algn="tl">
                       <a:srgbClr val="000000">
@@ -8110,7 +8210,7 @@
                 </a:spcAft>
               </a:pPr>
               <a:r>
-                <a:rPr lang="en-US" sz="2800" dirty="0">
+                <a:rPr lang="en-US" sz="2800">
                   <a:effectLst>
                     <a:outerShdw blurRad="38100" dist="38100" dir="2700000" algn="tl">
                       <a:srgbClr val="000000">
@@ -8131,7 +8231,7 @@
                 </a:spcAft>
               </a:pPr>
               <a:r>
-                <a:rPr lang="en-US" sz="2800" dirty="0">
+                <a:rPr lang="en-US" sz="2800">
                   <a:effectLst>
                     <a:outerShdw blurRad="38100" dist="38100" dir="2700000" algn="tl">
                       <a:srgbClr val="000000">
@@ -8152,7 +8252,7 @@
                 </a:spcAft>
               </a:pPr>
               <a:r>
-                <a:rPr lang="en-US" sz="2800" dirty="0">
+                <a:rPr lang="en-US" sz="2800">
                   <a:effectLst>
                     <a:outerShdw blurRad="38100" dist="38100" dir="2700000" algn="tl">
                       <a:srgbClr val="000000">
@@ -8310,7 +8410,7 @@
             <a:lstStyle/>
             <a:p>
               <a:r>
-                <a:rPr lang="en-US" sz="4400" dirty="0">
+                <a:rPr lang="en-US" sz="4400">
                   <a:effectLst>
                     <a:outerShdw blurRad="38100" dist="38100" dir="2700000" algn="tl">
                       <a:srgbClr val="000000">
@@ -8324,7 +8424,7 @@
                 <a:t>This course is </a:t>
               </a:r>
               <a:r>
-                <a:rPr lang="en-US" sz="4400" b="1" dirty="0">
+                <a:rPr lang="en-US" sz="4400" b="1">
                   <a:effectLst>
                     <a:outerShdw blurRad="38100" dist="38100" dir="2700000" algn="tl">
                       <a:srgbClr val="000000">
@@ -8337,7 +8437,7 @@
                 </a:rPr>
                 <a:t>essential</a:t>
               </a:r>
-              <a:endParaRPr lang="en-US" sz="4400" dirty="0">
+              <a:endParaRPr lang="en-US" sz="4400">
                 <a:effectLst>
                   <a:outerShdw blurRad="38100" dist="38100" dir="2700000" algn="tl">
                     <a:srgbClr val="000000">
@@ -8385,7 +8485,7 @@
                 </a:spcAft>
               </a:pPr>
               <a:r>
-                <a:rPr lang="en-US" sz="2800" dirty="0">
+                <a:rPr lang="en-US" sz="2800">
                   <a:effectLst>
                     <a:outerShdw blurRad="38100" dist="38100" dir="2700000" algn="tl">
                       <a:srgbClr val="000000">
@@ -8406,7 +8506,7 @@
                 </a:spcAft>
               </a:pPr>
               <a:r>
-                <a:rPr lang="en-US" sz="2800" dirty="0">
+                <a:rPr lang="en-US" sz="2800">
                   <a:effectLst>
                     <a:outerShdw blurRad="38100" dist="38100" dir="2700000" algn="tl">
                       <a:srgbClr val="000000">
@@ -8543,7 +8643,7 @@
                     </m:oMath>
                   </m:oMathPara>
                 </a14:m>
-                <a:endParaRPr lang="en-US" dirty="0"/>
+                <a:endParaRPr lang="en-US"/>
               </a:p>
             </p:txBody>
           </p:sp>
@@ -8627,7 +8727,7 @@
               </a:spcAft>
             </a:pPr>
             <a:r>
-              <a:rPr lang="en-US" sz="2400" dirty="0">
+              <a:rPr lang="en-US" sz="2400">
                 <a:effectLst>
                   <a:outerShdw blurRad="38100" dist="38100" dir="2700000" algn="tl">
                     <a:srgbClr val="000000">
@@ -8680,7 +8780,7 @@
               </a:spcAft>
             </a:pPr>
             <a:r>
-              <a:rPr lang="en-US" sz="1050" dirty="0">
+              <a:rPr lang="en-US" sz="1050">
                 <a:solidFill>
                   <a:srgbClr val="0000FF"/>
                 </a:solidFill>
@@ -8690,7 +8790,7 @@
               <a:t>public class </a:t>
             </a:r>
             <a:r>
-              <a:rPr lang="en-US" sz="1050" dirty="0" err="1">
+              <a:rPr lang="en-US" sz="1050" err="1">
                 <a:solidFill>
                   <a:srgbClr val="267F99"/>
                 </a:solidFill>
@@ -8700,7 +8800,7 @@
               <a:t>TallyMap</a:t>
             </a:r>
             <a:r>
-              <a:rPr lang="en-US" sz="1050" dirty="0">
+              <a:rPr lang="en-US" sz="1050">
                 <a:solidFill>
                   <a:srgbClr val="3B3B3B"/>
                 </a:solidFill>
@@ -8710,7 +8810,7 @@
               <a:t>&lt;</a:t>
             </a:r>
             <a:r>
-              <a:rPr lang="en-US" sz="1050" dirty="0">
+              <a:rPr lang="en-US" sz="1050">
                 <a:solidFill>
                   <a:srgbClr val="267F99"/>
                 </a:solidFill>
@@ -8720,7 +8820,7 @@
               <a:t>K</a:t>
             </a:r>
             <a:r>
-              <a:rPr lang="en-US" sz="1050" dirty="0">
+              <a:rPr lang="en-US" sz="1050">
                 <a:solidFill>
                   <a:srgbClr val="3B3B3B"/>
                 </a:solidFill>
@@ -8730,7 +8830,7 @@
               <a:t>&gt; </a:t>
             </a:r>
             <a:r>
-              <a:rPr lang="en-US" sz="1050" dirty="0">
+              <a:rPr lang="en-US" sz="1050">
                 <a:solidFill>
                   <a:srgbClr val="0000FF"/>
                 </a:solidFill>
@@ -8740,7 +8840,7 @@
               <a:t>extends </a:t>
             </a:r>
             <a:r>
-              <a:rPr lang="en-US" sz="1050" dirty="0">
+              <a:rPr lang="en-US" sz="1050">
                 <a:solidFill>
                   <a:srgbClr val="267F99"/>
                 </a:solidFill>
@@ -8750,7 +8850,7 @@
               <a:t>HashMap</a:t>
             </a:r>
             <a:r>
-              <a:rPr lang="en-US" sz="1050" dirty="0">
+              <a:rPr lang="en-US" sz="1050">
                 <a:solidFill>
                   <a:srgbClr val="3B3B3B"/>
                 </a:solidFill>
@@ -8759,7 +8859,7 @@
               </a:rPr>
               <a:t> {</a:t>
             </a:r>
-            <a:endParaRPr lang="en-US" sz="1050" dirty="0">
+            <a:endParaRPr lang="en-US" sz="1050">
               <a:effectLst/>
               <a:latin typeface="Consolas" panose="020B0609020204030204" pitchFamily="49" charset="0"/>
             </a:endParaRPr>
@@ -8774,7 +8874,7 @@
               </a:spcAft>
             </a:pPr>
             <a:r>
-              <a:rPr lang="en-US" sz="1050" dirty="0">
+              <a:rPr lang="en-US" sz="1050">
                 <a:solidFill>
                   <a:srgbClr val="3B3B3B"/>
                 </a:solidFill>
@@ -8784,7 +8884,7 @@
               <a:t>    </a:t>
             </a:r>
             <a:r>
-              <a:rPr lang="en-US" sz="1050" dirty="0">
+              <a:rPr lang="en-US" sz="1050">
                 <a:solidFill>
                   <a:srgbClr val="0000FF"/>
                 </a:solidFill>
@@ -8794,7 +8894,7 @@
               <a:t>public </a:t>
             </a:r>
             <a:r>
-              <a:rPr lang="en-US" sz="1050" dirty="0">
+              <a:rPr lang="en-US" sz="1050">
                 <a:solidFill>
                   <a:srgbClr val="267F99"/>
                 </a:solidFill>
@@ -8804,7 +8904,7 @@
               <a:t>void </a:t>
             </a:r>
             <a:r>
-              <a:rPr lang="en-US" sz="1050" dirty="0">
+              <a:rPr lang="en-US" sz="1050">
                 <a:solidFill>
                   <a:srgbClr val="795E26"/>
                 </a:solidFill>
@@ -8814,7 +8914,7 @@
               <a:t>increment</a:t>
             </a:r>
             <a:r>
-              <a:rPr lang="en-US" sz="1050" dirty="0">
+              <a:rPr lang="en-US" sz="1050">
                 <a:solidFill>
                   <a:srgbClr val="3B3B3B"/>
                 </a:solidFill>
@@ -8824,7 +8924,7 @@
               <a:t>(</a:t>
             </a:r>
             <a:r>
-              <a:rPr lang="en-US" sz="1050" dirty="0">
+              <a:rPr lang="en-US" sz="1050">
                 <a:solidFill>
                   <a:srgbClr val="267F99"/>
                 </a:solidFill>
@@ -8834,7 +8934,7 @@
               <a:t>K </a:t>
             </a:r>
             <a:r>
-              <a:rPr lang="en-US" sz="1050" dirty="0">
+              <a:rPr lang="en-US" sz="1050">
                 <a:solidFill>
                   <a:srgbClr val="001080"/>
                 </a:solidFill>
@@ -8844,7 +8944,7 @@
               <a:t>key</a:t>
             </a:r>
             <a:r>
-              <a:rPr lang="en-US" sz="1050" dirty="0">
+              <a:rPr lang="en-US" sz="1050">
                 <a:solidFill>
                   <a:srgbClr val="3B3B3B"/>
                 </a:solidFill>
@@ -8853,7 +8953,7 @@
               </a:rPr>
               <a:t>){</a:t>
             </a:r>
-            <a:endParaRPr lang="en-US" sz="1050" dirty="0">
+            <a:endParaRPr lang="en-US" sz="1050">
               <a:effectLst/>
               <a:latin typeface="Consolas" panose="020B0609020204030204" pitchFamily="49" charset="0"/>
             </a:endParaRPr>
@@ -8868,7 +8968,7 @@
               </a:spcAft>
             </a:pPr>
             <a:r>
-              <a:rPr lang="en-US" sz="1050" dirty="0">
+              <a:rPr lang="en-US" sz="1050">
                 <a:solidFill>
                   <a:srgbClr val="3B3B3B"/>
                 </a:solidFill>
@@ -8878,7 +8978,7 @@
               <a:t>        </a:t>
             </a:r>
             <a:r>
-              <a:rPr lang="en-US" sz="1050" dirty="0">
+              <a:rPr lang="en-US" sz="1050">
                 <a:solidFill>
                   <a:srgbClr val="008000"/>
                 </a:solidFill>
@@ -8887,7 +8987,7 @@
               </a:rPr>
               <a:t>// If the key is not in the map, add it with a value of one</a:t>
             </a:r>
-            <a:endParaRPr lang="en-US" sz="1050" dirty="0">
+            <a:endParaRPr lang="en-US" sz="1050">
               <a:effectLst/>
               <a:latin typeface="Consolas" panose="020B0609020204030204" pitchFamily="49" charset="0"/>
             </a:endParaRPr>
@@ -8902,7 +9002,7 @@
               </a:spcAft>
             </a:pPr>
             <a:r>
-              <a:rPr lang="en-US" sz="1050" dirty="0">
+              <a:rPr lang="en-US" sz="1050">
                 <a:solidFill>
                   <a:srgbClr val="3B3B3B"/>
                 </a:solidFill>
@@ -8912,7 +9012,7 @@
               <a:t>        </a:t>
             </a:r>
             <a:r>
-              <a:rPr lang="en-US" sz="1050" dirty="0">
+              <a:rPr lang="en-US" sz="1050">
                 <a:solidFill>
                   <a:srgbClr val="AF00DB"/>
                 </a:solidFill>
@@ -8922,7 +9022,7 @@
               <a:t>if</a:t>
             </a:r>
             <a:r>
-              <a:rPr lang="en-US" sz="1050" dirty="0">
+              <a:rPr lang="en-US" sz="1050">
                 <a:solidFill>
                   <a:srgbClr val="3B3B3B"/>
                 </a:solidFill>
@@ -8932,7 +9032,7 @@
               <a:t> (</a:t>
             </a:r>
             <a:r>
-              <a:rPr lang="en-US" sz="1050" dirty="0" err="1">
+              <a:rPr lang="en-US" sz="1050" err="1">
                 <a:solidFill>
                   <a:srgbClr val="0000FF"/>
                 </a:solidFill>
@@ -8942,7 +9042,7 @@
               <a:t>this</a:t>
             </a:r>
             <a:r>
-              <a:rPr lang="en-US" sz="1050" dirty="0" err="1">
+              <a:rPr lang="en-US" sz="1050" err="1">
                 <a:solidFill>
                   <a:srgbClr val="3B3B3B"/>
                 </a:solidFill>
@@ -8952,7 +9052,7 @@
               <a:t>.</a:t>
             </a:r>
             <a:r>
-              <a:rPr lang="en-US" sz="1050" dirty="0" err="1">
+              <a:rPr lang="en-US" sz="1050" err="1">
                 <a:solidFill>
                   <a:srgbClr val="795E26"/>
                 </a:solidFill>
@@ -8962,7 +9062,7 @@
               <a:t>get</a:t>
             </a:r>
             <a:r>
-              <a:rPr lang="en-US" sz="1050" dirty="0">
+              <a:rPr lang="en-US" sz="1050">
                 <a:solidFill>
                   <a:srgbClr val="3B3B3B"/>
                 </a:solidFill>
@@ -8972,7 +9072,7 @@
               <a:t>(</a:t>
             </a:r>
             <a:r>
-              <a:rPr lang="en-US" sz="1050" dirty="0">
+              <a:rPr lang="en-US" sz="1050">
                 <a:solidFill>
                   <a:srgbClr val="001080"/>
                 </a:solidFill>
@@ -8982,7 +9082,7 @@
               <a:t>key</a:t>
             </a:r>
             <a:r>
-              <a:rPr lang="en-US" sz="1050" dirty="0">
+              <a:rPr lang="en-US" sz="1050">
                 <a:solidFill>
                   <a:srgbClr val="3B3B3B"/>
                 </a:solidFill>
@@ -8992,7 +9092,7 @@
               <a:t>) </a:t>
             </a:r>
             <a:r>
-              <a:rPr lang="en-US" sz="1050" dirty="0">
+              <a:rPr lang="en-US" sz="1050">
                 <a:solidFill>
                   <a:srgbClr val="000000"/>
                 </a:solidFill>
@@ -9002,7 +9102,7 @@
               <a:t>== </a:t>
             </a:r>
             <a:r>
-              <a:rPr lang="en-US" sz="1050" dirty="0">
+              <a:rPr lang="en-US" sz="1050">
                 <a:solidFill>
                   <a:srgbClr val="0000FF"/>
                 </a:solidFill>
@@ -9012,7 +9112,7 @@
               <a:t>null</a:t>
             </a:r>
             <a:r>
-              <a:rPr lang="en-US" sz="1050" dirty="0">
+              <a:rPr lang="en-US" sz="1050">
                 <a:solidFill>
                   <a:srgbClr val="3B3B3B"/>
                 </a:solidFill>
@@ -9021,7 +9121,7 @@
               </a:rPr>
               <a:t>) {</a:t>
             </a:r>
-            <a:endParaRPr lang="en-US" sz="1050" dirty="0">
+            <a:endParaRPr lang="en-US" sz="1050">
               <a:effectLst/>
               <a:latin typeface="Consolas" panose="020B0609020204030204" pitchFamily="49" charset="0"/>
             </a:endParaRPr>
@@ -9036,7 +9136,7 @@
               </a:spcAft>
             </a:pPr>
             <a:r>
-              <a:rPr lang="en-US" sz="1050" dirty="0">
+              <a:rPr lang="en-US" sz="1050">
                 <a:solidFill>
                   <a:srgbClr val="3B3B3B"/>
                 </a:solidFill>
@@ -9046,7 +9146,7 @@
               <a:t>            </a:t>
             </a:r>
             <a:r>
-              <a:rPr lang="en-US" sz="1050" dirty="0" err="1">
+              <a:rPr lang="en-US" sz="1050" err="1">
                 <a:solidFill>
                   <a:srgbClr val="0000FF"/>
                 </a:solidFill>
@@ -9056,7 +9156,7 @@
               <a:t>this</a:t>
             </a:r>
             <a:r>
-              <a:rPr lang="en-US" sz="1050" dirty="0" err="1">
+              <a:rPr lang="en-US" sz="1050" err="1">
                 <a:solidFill>
                   <a:srgbClr val="3B3B3B"/>
                 </a:solidFill>
@@ -9066,7 +9166,7 @@
               <a:t>.</a:t>
             </a:r>
             <a:r>
-              <a:rPr lang="en-US" sz="1050" dirty="0" err="1">
+              <a:rPr lang="en-US" sz="1050" err="1">
                 <a:solidFill>
                   <a:srgbClr val="795E26"/>
                 </a:solidFill>
@@ -9076,7 +9176,7 @@
               <a:t>put</a:t>
             </a:r>
             <a:r>
-              <a:rPr lang="en-US" sz="1050" dirty="0">
+              <a:rPr lang="en-US" sz="1050">
                 <a:solidFill>
                   <a:srgbClr val="3B3B3B"/>
                 </a:solidFill>
@@ -9086,7 +9186,7 @@
               <a:t>(</a:t>
             </a:r>
             <a:r>
-              <a:rPr lang="en-US" sz="1050" dirty="0">
+              <a:rPr lang="en-US" sz="1050">
                 <a:solidFill>
                   <a:srgbClr val="001080"/>
                 </a:solidFill>
@@ -9096,7 +9196,7 @@
               <a:t>key</a:t>
             </a:r>
             <a:r>
-              <a:rPr lang="en-US" sz="1050" dirty="0">
+              <a:rPr lang="en-US" sz="1050">
                 <a:solidFill>
                   <a:srgbClr val="3B3B3B"/>
                 </a:solidFill>
@@ -9106,7 +9206,7 @@
               <a:t>, </a:t>
             </a:r>
             <a:r>
-              <a:rPr lang="en-US" sz="1050" dirty="0">
+              <a:rPr lang="en-US" sz="1050">
                 <a:solidFill>
                   <a:srgbClr val="098658"/>
                 </a:solidFill>
@@ -9116,7 +9216,7 @@
               <a:t>1</a:t>
             </a:r>
             <a:r>
-              <a:rPr lang="en-US" sz="1050" dirty="0">
+              <a:rPr lang="en-US" sz="1050">
                 <a:solidFill>
                   <a:srgbClr val="3B3B3B"/>
                 </a:solidFill>
@@ -9125,7 +9225,7 @@
               </a:rPr>
               <a:t>);</a:t>
             </a:r>
-            <a:endParaRPr lang="en-US" sz="1050" dirty="0">
+            <a:endParaRPr lang="en-US" sz="1050">
               <a:effectLst/>
               <a:latin typeface="Consolas" panose="020B0609020204030204" pitchFamily="49" charset="0"/>
             </a:endParaRPr>
@@ -9140,7 +9240,7 @@
               </a:spcAft>
             </a:pPr>
             <a:r>
-              <a:rPr lang="en-US" sz="1050" dirty="0">
+              <a:rPr lang="en-US" sz="1050">
                 <a:solidFill>
                   <a:srgbClr val="3B3B3B"/>
                 </a:solidFill>
@@ -9150,7 +9250,7 @@
               <a:t>        </a:t>
             </a:r>
             <a:r>
-              <a:rPr lang="en-US" sz="1050" dirty="0">
+              <a:rPr lang="en-US" sz="1050">
                 <a:solidFill>
                   <a:srgbClr val="008000"/>
                 </a:solidFill>
@@ -9159,7 +9259,7 @@
               </a:rPr>
               <a:t>// If the key is already in the map, add one to the value</a:t>
             </a:r>
-            <a:endParaRPr lang="en-US" sz="1050" dirty="0">
+            <a:endParaRPr lang="en-US" sz="1050">
               <a:effectLst/>
               <a:latin typeface="Consolas" panose="020B0609020204030204" pitchFamily="49" charset="0"/>
             </a:endParaRPr>
@@ -9174,7 +9274,7 @@
               </a:spcAft>
             </a:pPr>
             <a:r>
-              <a:rPr lang="en-US" sz="1050" dirty="0">
+              <a:rPr lang="en-US" sz="1050">
                 <a:solidFill>
                   <a:srgbClr val="3B3B3B"/>
                 </a:solidFill>
@@ -9184,7 +9284,7 @@
               <a:t>        } </a:t>
             </a:r>
             <a:r>
-              <a:rPr lang="en-US" sz="1050" dirty="0">
+              <a:rPr lang="en-US" sz="1050">
                 <a:solidFill>
                   <a:srgbClr val="AF00DB"/>
                 </a:solidFill>
@@ -9194,7 +9294,7 @@
               <a:t>else</a:t>
             </a:r>
             <a:r>
-              <a:rPr lang="en-US" sz="1050" dirty="0">
+              <a:rPr lang="en-US" sz="1050">
                 <a:solidFill>
                   <a:srgbClr val="3B3B3B"/>
                 </a:solidFill>
@@ -9203,7 +9303,7 @@
               </a:rPr>
               <a:t> {</a:t>
             </a:r>
-            <a:endParaRPr lang="en-US" sz="1050" dirty="0">
+            <a:endParaRPr lang="en-US" sz="1050">
               <a:effectLst/>
               <a:latin typeface="Consolas" panose="020B0609020204030204" pitchFamily="49" charset="0"/>
             </a:endParaRPr>
@@ -9218,7 +9318,7 @@
               </a:spcAft>
             </a:pPr>
             <a:r>
-              <a:rPr lang="en-US" sz="1050" dirty="0">
+              <a:rPr lang="en-US" sz="1050">
                 <a:solidFill>
                   <a:srgbClr val="3B3B3B"/>
                 </a:solidFill>
@@ -9228,7 +9328,7 @@
               <a:t>            </a:t>
             </a:r>
             <a:r>
-              <a:rPr lang="en-US" sz="1050" dirty="0" err="1">
+              <a:rPr lang="en-US" sz="1050" err="1">
                 <a:solidFill>
                   <a:srgbClr val="0000FF"/>
                 </a:solidFill>
@@ -9238,7 +9338,7 @@
               <a:t>this</a:t>
             </a:r>
             <a:r>
-              <a:rPr lang="en-US" sz="1050" dirty="0" err="1">
+              <a:rPr lang="en-US" sz="1050" err="1">
                 <a:solidFill>
                   <a:srgbClr val="3B3B3B"/>
                 </a:solidFill>
@@ -9248,7 +9348,7 @@
               <a:t>.</a:t>
             </a:r>
             <a:r>
-              <a:rPr lang="en-US" sz="1050" dirty="0" err="1">
+              <a:rPr lang="en-US" sz="1050" err="1">
                 <a:solidFill>
                   <a:srgbClr val="795E26"/>
                 </a:solidFill>
@@ -9258,7 +9358,7 @@
               <a:t>put</a:t>
             </a:r>
             <a:r>
-              <a:rPr lang="en-US" sz="1050" dirty="0">
+              <a:rPr lang="en-US" sz="1050">
                 <a:solidFill>
                   <a:srgbClr val="3B3B3B"/>
                 </a:solidFill>
@@ -9268,7 +9368,7 @@
               <a:t>(</a:t>
             </a:r>
             <a:r>
-              <a:rPr lang="en-US" sz="1050" dirty="0">
+              <a:rPr lang="en-US" sz="1050">
                 <a:solidFill>
                   <a:srgbClr val="001080"/>
                 </a:solidFill>
@@ -9278,7 +9378,7 @@
               <a:t>key</a:t>
             </a:r>
             <a:r>
-              <a:rPr lang="en-US" sz="1050" dirty="0">
+              <a:rPr lang="en-US" sz="1050">
                 <a:solidFill>
                   <a:srgbClr val="3B3B3B"/>
                 </a:solidFill>
@@ -9288,7 +9388,7 @@
               <a:t>, </a:t>
             </a:r>
             <a:r>
-              <a:rPr lang="en-US" sz="1050" dirty="0" err="1">
+              <a:rPr lang="en-US" sz="1050" err="1">
                 <a:solidFill>
                   <a:srgbClr val="0000FF"/>
                 </a:solidFill>
@@ -9298,7 +9398,7 @@
               <a:t>this</a:t>
             </a:r>
             <a:r>
-              <a:rPr lang="en-US" sz="1050" dirty="0" err="1">
+              <a:rPr lang="en-US" sz="1050" err="1">
                 <a:solidFill>
                   <a:srgbClr val="3B3B3B"/>
                 </a:solidFill>
@@ -9308,7 +9408,7 @@
               <a:t>.</a:t>
             </a:r>
             <a:r>
-              <a:rPr lang="en-US" sz="1050" dirty="0" err="1">
+              <a:rPr lang="en-US" sz="1050" err="1">
                 <a:solidFill>
                   <a:srgbClr val="795E26"/>
                 </a:solidFill>
@@ -9318,7 +9418,7 @@
               <a:t>get</a:t>
             </a:r>
             <a:r>
-              <a:rPr lang="en-US" sz="1050" dirty="0">
+              <a:rPr lang="en-US" sz="1050">
                 <a:solidFill>
                   <a:srgbClr val="3B3B3B"/>
                 </a:solidFill>
@@ -9328,7 +9428,7 @@
               <a:t>(</a:t>
             </a:r>
             <a:r>
-              <a:rPr lang="en-US" sz="1050" dirty="0">
+              <a:rPr lang="en-US" sz="1050">
                 <a:solidFill>
                   <a:srgbClr val="001080"/>
                 </a:solidFill>
@@ -9338,7 +9438,7 @@
               <a:t>key</a:t>
             </a:r>
             <a:r>
-              <a:rPr lang="en-US" sz="1050" dirty="0">
+              <a:rPr lang="en-US" sz="1050">
                 <a:solidFill>
                   <a:srgbClr val="3B3B3B"/>
                 </a:solidFill>
@@ -9348,7 +9448,7 @@
               <a:t>) </a:t>
             </a:r>
             <a:r>
-              <a:rPr lang="en-US" sz="1050" dirty="0">
+              <a:rPr lang="en-US" sz="1050">
                 <a:solidFill>
                   <a:srgbClr val="000000"/>
                 </a:solidFill>
@@ -9358,7 +9458,7 @@
               <a:t>+ </a:t>
             </a:r>
             <a:r>
-              <a:rPr lang="en-US" sz="1050" dirty="0">
+              <a:rPr lang="en-US" sz="1050">
                 <a:solidFill>
                   <a:srgbClr val="098658"/>
                 </a:solidFill>
@@ -9368,7 +9468,7 @@
               <a:t>1</a:t>
             </a:r>
             <a:r>
-              <a:rPr lang="en-US" sz="1050" dirty="0">
+              <a:rPr lang="en-US" sz="1050">
                 <a:solidFill>
                   <a:srgbClr val="3B3B3B"/>
                 </a:solidFill>
@@ -9377,7 +9477,7 @@
               </a:rPr>
               <a:t>);</a:t>
             </a:r>
-            <a:endParaRPr lang="en-US" sz="1050" dirty="0">
+            <a:endParaRPr lang="en-US" sz="1050">
               <a:effectLst/>
               <a:latin typeface="Consolas" panose="020B0609020204030204" pitchFamily="49" charset="0"/>
             </a:endParaRPr>
@@ -9392,7 +9492,7 @@
               </a:spcAft>
             </a:pPr>
             <a:r>
-              <a:rPr lang="en-US" sz="1050" dirty="0">
+              <a:rPr lang="en-US" sz="1050">
                 <a:solidFill>
                   <a:srgbClr val="3B3B3B"/>
                 </a:solidFill>
@@ -9412,7 +9512,7 @@
               </a:spcAft>
             </a:pPr>
             <a:r>
-              <a:rPr lang="en-US" sz="1050" dirty="0">
+              <a:rPr lang="en-US" sz="1050">
                 <a:solidFill>
                   <a:srgbClr val="3B3B3B"/>
                 </a:solidFill>
@@ -9432,7 +9532,7 @@
               </a:spcAft>
             </a:pPr>
             <a:r>
-              <a:rPr lang="en-US" sz="1050" dirty="0">
+              <a:rPr lang="en-US" sz="1050">
                 <a:solidFill>
                   <a:srgbClr val="3B3B3B"/>
                 </a:solidFill>
@@ -9761,7 +9861,7 @@
             <a:lstStyle/>
             <a:p>
               <a:r>
-                <a:rPr lang="en-US" sz="4400" dirty="0">
+                <a:rPr lang="en-US" sz="4400">
                   <a:effectLst>
                     <a:outerShdw blurRad="38100" dist="38100" dir="2700000" algn="tl">
                       <a:srgbClr val="000000">
@@ -9775,7 +9875,7 @@
                 <a:t>You can expect and demand</a:t>
               </a:r>
               <a:br>
-                <a:rPr lang="en-US" sz="4400" dirty="0">
+                <a:rPr lang="en-US" sz="4400">
                   <a:effectLst>
                     <a:outerShdw blurRad="38100" dist="38100" dir="2700000" algn="tl">
                       <a:srgbClr val="000000">
@@ -9788,7 +9888,7 @@
                 </a:rPr>
               </a:br>
               <a:r>
-                <a:rPr lang="en-US" sz="4400" dirty="0">
+                <a:rPr lang="en-US" sz="4400">
                   <a:effectLst>
                     <a:outerShdw blurRad="38100" dist="38100" dir="2700000" algn="tl">
                       <a:srgbClr val="000000">
@@ -9838,7 +9938,7 @@
                 </a:spcAft>
               </a:pPr>
               <a:r>
-                <a:rPr lang="en-US" sz="2800" dirty="0">
+                <a:rPr lang="en-US" sz="2800">
                   <a:effectLst>
                     <a:outerShdw blurRad="38100" dist="38100" dir="2700000" algn="tl">
                       <a:srgbClr val="000000">
@@ -9859,7 +9959,7 @@
                 </a:spcAft>
               </a:pPr>
               <a:r>
-                <a:rPr lang="en-US" sz="2800" dirty="0">
+                <a:rPr lang="en-US" sz="2800">
                   <a:effectLst>
                     <a:outerShdw blurRad="38100" dist="38100" dir="2700000" algn="tl">
                       <a:srgbClr val="000000">
@@ -9880,7 +9980,7 @@
                 </a:spcAft>
               </a:pPr>
               <a:r>
-                <a:rPr lang="en-US" sz="2800" dirty="0">
+                <a:rPr lang="en-US" sz="2800">
                   <a:effectLst>
                     <a:outerShdw blurRad="38100" dist="38100" dir="2700000" algn="tl">
                       <a:srgbClr val="000000">
@@ -9901,7 +10001,7 @@
                 </a:spcAft>
               </a:pPr>
               <a:r>
-                <a:rPr lang="en-US" sz="2800" dirty="0">
+                <a:rPr lang="en-US" sz="2800">
                   <a:effectLst>
                     <a:outerShdw blurRad="38100" dist="38100" dir="2700000" algn="tl">
                       <a:srgbClr val="000000">
@@ -9947,7 +10047,7 @@
           <a:lstStyle/>
           <a:p>
             <a:r>
-              <a:rPr lang="en-US" sz="4400" dirty="0">
+              <a:rPr lang="en-US" sz="4400">
                 <a:effectLst>
                   <a:outerShdw blurRad="38100" dist="38100" dir="2700000" algn="tl">
                     <a:srgbClr val="000000">
@@ -9961,7 +10061,7 @@
               <a:t>I will expect and demand the</a:t>
             </a:r>
             <a:br>
-              <a:rPr lang="en-US" sz="4400" dirty="0">
+              <a:rPr lang="en-US" sz="4400">
                 <a:effectLst>
                   <a:outerShdw blurRad="38100" dist="38100" dir="2700000" algn="tl">
                     <a:srgbClr val="000000">
@@ -9974,7 +10074,7 @@
               </a:rPr>
             </a:br>
             <a:r>
-              <a:rPr lang="en-US" sz="4400" dirty="0">
+              <a:rPr lang="en-US" sz="4400">
                 <a:effectLst>
                   <a:outerShdw blurRad="38100" dist="38100" dir="2700000" algn="tl">
                     <a:srgbClr val="000000">
@@ -10217,7 +10317,7 @@
             <a:lstStyle/>
             <a:p>
               <a:r>
-                <a:rPr lang="en-US" sz="4400" dirty="0">
+                <a:rPr lang="en-US" sz="4400">
                   <a:effectLst>
                     <a:outerShdw blurRad="38100" dist="38100" dir="2700000" algn="tl">
                       <a:srgbClr val="000000">
@@ -10267,7 +10367,7 @@
                 </a:spcAft>
               </a:pPr>
               <a:r>
-                <a:rPr lang="en-US" sz="2800" dirty="0">
+                <a:rPr lang="en-US" sz="2800">
                   <a:effectLst>
                     <a:outerShdw blurRad="38100" dist="38100" dir="2700000" algn="tl">
                       <a:srgbClr val="000000">
@@ -10288,7 +10388,7 @@
                 </a:spcAft>
               </a:pPr>
               <a:r>
-                <a:rPr lang="en-US" sz="2800" dirty="0">
+                <a:rPr lang="en-US" sz="2800">
                   <a:effectLst>
                     <a:outerShdw blurRad="38100" dist="38100" dir="2700000" algn="tl">
                       <a:srgbClr val="000000">
@@ -10309,7 +10409,7 @@
                 </a:spcAft>
               </a:pPr>
               <a:r>
-                <a:rPr lang="en-US" sz="2800" dirty="0">
+                <a:rPr lang="en-US" sz="2800">
                   <a:effectLst>
                     <a:outerShdw blurRad="38100" dist="38100" dir="2700000" algn="tl">
                       <a:srgbClr val="000000">
@@ -10330,7 +10430,7 @@
                 </a:spcAft>
               </a:pPr>
               <a:r>
-                <a:rPr lang="en-US" sz="2800" dirty="0">
+                <a:rPr lang="en-US" sz="2800">
                   <a:effectLst>
                     <a:outerShdw blurRad="38100" dist="38100" dir="2700000" algn="tl">
                       <a:srgbClr val="000000">
@@ -10351,7 +10451,7 @@
                 </a:spcAft>
               </a:pPr>
               <a:r>
-                <a:rPr lang="en-US" sz="2800" dirty="0">
+                <a:rPr lang="en-US" sz="2800">
                   <a:effectLst>
                     <a:outerShdw blurRad="38100" dist="38100" dir="2700000" algn="tl">
                       <a:srgbClr val="000000">
@@ -10371,7 +10471,7 @@
                   <a:spcPts val="1200"/>
                 </a:spcAft>
               </a:pPr>
-              <a:endParaRPr lang="en-US" sz="2800" dirty="0">
+              <a:endParaRPr lang="en-US" sz="2800">
                 <a:effectLst>
                   <a:outerShdw blurRad="38100" dist="38100" dir="2700000" algn="tl">
                     <a:srgbClr val="000000">
@@ -10390,7 +10490,7 @@
                 </a:spcAft>
               </a:pPr>
               <a:r>
-                <a:rPr lang="en-US" sz="2800" dirty="0">
+                <a:rPr lang="en-US" sz="2800">
                   <a:effectLst>
                     <a:outerShdw blurRad="38100" dist="38100" dir="2700000" algn="tl">
                       <a:srgbClr val="000000">
@@ -10528,7 +10628,7 @@
           <a:lstStyle/>
           <a:p>
             <a:r>
-              <a:rPr lang="en-US" sz="4400" dirty="0">
+              <a:rPr lang="en-US" sz="4400">
                 <a:effectLst>
                   <a:outerShdw blurRad="38100" dist="38100" dir="2700000" algn="tl">
                     <a:srgbClr val="000000">
@@ -10721,7 +10821,7 @@
           <a:lstStyle/>
           <a:p>
             <a:r>
-              <a:rPr lang="en-US" sz="4400" dirty="0">
+              <a:rPr lang="en-US" sz="4400">
                 <a:effectLst>
                   <a:outerShdw blurRad="38100" dist="38100" dir="2700000" algn="tl">
                     <a:srgbClr val="000000">
@@ -10752,7 +10852,7 @@
           <p:nvPr>
             <p:extLst>
               <p:ext uri="{D42A27DB-BD31-4B8C-83A1-F6EECF244321}">
-                <p14:modId xmlns:p14="http://schemas.microsoft.com/office/powerpoint/2010/main" val="1278734456"/>
+                <p14:modId xmlns:p14="http://schemas.microsoft.com/office/powerpoint/2010/main" val="1176899846"/>
               </p:ext>
             </p:extLst>
           </p:nvPr>
@@ -10810,77 +10910,11 @@
                         </a:spcAft>
                       </a:pPr>
                       <a:r>
-                        <a:rPr lang="en-US" sz="1800" b="1" dirty="0">
-                          <a:effectLst/>
-                          <a:latin typeface="Calibri" panose="020F0502020204030204" pitchFamily="34" charset="0"/>
-                        </a:rPr>
-                        <a:t>Sunday</a:t>
-                      </a:r>
-                      <a:endParaRPr lang="en-US" sz="1800" dirty="0">
-                        <a:effectLst/>
-                        <a:latin typeface="Calibri" panose="020F0502020204030204" pitchFamily="34" charset="0"/>
-                      </a:endParaRPr>
-                    </a:p>
-                  </a:txBody>
-                  <a:tcPr marL="46796" marR="46796" marT="46796" marB="46796">
-                    <a:lnL w="12700" cap="flat" cmpd="sng" algn="ctr">
-                      <a:solidFill>
-                        <a:srgbClr val="A3A3A3"/>
-                      </a:solidFill>
-                      <a:prstDash val="solid"/>
-                      <a:round/>
-                      <a:headEnd type="none" w="med" len="med"/>
-                      <a:tailEnd type="none" w="med" len="med"/>
-                    </a:lnL>
-                    <a:lnR w="12700" cap="flat" cmpd="sng" algn="ctr">
-                      <a:solidFill>
-                        <a:srgbClr val="A3A3A3"/>
-                      </a:solidFill>
-                      <a:prstDash val="solid"/>
-                      <a:round/>
-                      <a:headEnd type="none" w="med" len="med"/>
-                      <a:tailEnd type="none" w="med" len="med"/>
-                    </a:lnR>
-                    <a:lnT w="12700" cap="flat" cmpd="sng" algn="ctr">
-                      <a:solidFill>
-                        <a:srgbClr val="A3A3A3"/>
-                      </a:solidFill>
-                      <a:prstDash val="solid"/>
-                      <a:round/>
-                      <a:headEnd type="none" w="med" len="med"/>
-                      <a:tailEnd type="none" w="med" len="med"/>
-                    </a:lnT>
-                    <a:lnB w="12700" cap="flat" cmpd="sng" algn="ctr">
-                      <a:solidFill>
-                        <a:srgbClr val="A3A3A3"/>
-                      </a:solidFill>
-                      <a:prstDash val="solid"/>
-                      <a:round/>
-                      <a:headEnd type="none" w="med" len="med"/>
-                      <a:tailEnd type="none" w="med" len="med"/>
-                    </a:lnB>
-                    <a:noFill/>
-                  </a:tcPr>
-                </a:tc>
-                <a:tc>
-                  <a:txBody>
-                    <a:bodyPr/>
-                    <a:lstStyle/>
-                    <a:p>
-                      <a:pPr marL="0" marR="0" fontAlgn="t">
-                        <a:spcBef>
-                          <a:spcPts val="0"/>
-                        </a:spcBef>
-                        <a:spcAft>
-                          <a:spcPts val="0"/>
-                        </a:spcAft>
-                      </a:pPr>
-                      <a:r>
                         <a:rPr lang="en-US" sz="1800" b="1">
                           <a:effectLst/>
                           <a:latin typeface="Calibri" panose="020F0502020204030204" pitchFamily="34" charset="0"/>
                         </a:rPr>
-                        <a:t>Tuesday</a:t>
+                        <a:t>Monday</a:t>
                       </a:r>
                       <a:endParaRPr lang="en-US" sz="1800">
                         <a:effectLst/>
@@ -10946,7 +10980,7 @@
                           <a:effectLst/>
                           <a:latin typeface="Calibri" panose="020F0502020204030204" pitchFamily="34" charset="0"/>
                         </a:rPr>
-                        <a:t>Thursday</a:t>
+                        <a:t>Wednesday</a:t>
                       </a:r>
                       <a:endParaRPr lang="en-US" sz="1800">
                         <a:effectLst/>
@@ -11008,13 +11042,79 @@
                         </a:spcAft>
                       </a:pPr>
                       <a:r>
-                        <a:rPr lang="en-US" sz="1800" b="1" dirty="0">
+                        <a:rPr lang="en-US" sz="1800" b="1">
+                          <a:effectLst/>
+                          <a:latin typeface="Calibri" panose="020F0502020204030204" pitchFamily="34" charset="0"/>
+                        </a:rPr>
+                        <a:t>Sunday</a:t>
+                      </a:r>
+                      <a:endParaRPr lang="en-US" sz="1800">
+                        <a:effectLst/>
+                        <a:latin typeface="Calibri" panose="020F0502020204030204" pitchFamily="34" charset="0"/>
+                      </a:endParaRPr>
+                    </a:p>
+                  </a:txBody>
+                  <a:tcPr marL="46796" marR="46796" marT="46796" marB="46796">
+                    <a:lnL w="12700" cap="flat" cmpd="sng" algn="ctr">
+                      <a:solidFill>
+                        <a:srgbClr val="A3A3A3"/>
+                      </a:solidFill>
+                      <a:prstDash val="solid"/>
+                      <a:round/>
+                      <a:headEnd type="none" w="med" len="med"/>
+                      <a:tailEnd type="none" w="med" len="med"/>
+                    </a:lnL>
+                    <a:lnR w="12700" cap="flat" cmpd="sng" algn="ctr">
+                      <a:solidFill>
+                        <a:srgbClr val="A3A3A3"/>
+                      </a:solidFill>
+                      <a:prstDash val="solid"/>
+                      <a:round/>
+                      <a:headEnd type="none" w="med" len="med"/>
+                      <a:tailEnd type="none" w="med" len="med"/>
+                    </a:lnR>
+                    <a:lnT w="12700" cap="flat" cmpd="sng" algn="ctr">
+                      <a:solidFill>
+                        <a:srgbClr val="A3A3A3"/>
+                      </a:solidFill>
+                      <a:prstDash val="solid"/>
+                      <a:round/>
+                      <a:headEnd type="none" w="med" len="med"/>
+                      <a:tailEnd type="none" w="med" len="med"/>
+                    </a:lnT>
+                    <a:lnB w="12700" cap="flat" cmpd="sng" algn="ctr">
+                      <a:solidFill>
+                        <a:srgbClr val="A3A3A3"/>
+                      </a:solidFill>
+                      <a:prstDash val="solid"/>
+                      <a:round/>
+                      <a:headEnd type="none" w="med" len="med"/>
+                      <a:tailEnd type="none" w="med" len="med"/>
+                    </a:lnB>
+                    <a:noFill/>
+                  </a:tcPr>
+                </a:tc>
+                <a:tc>
+                  <a:txBody>
+                    <a:bodyPr/>
+                    <a:lstStyle/>
+                    <a:p>
+                      <a:pPr marL="0" marR="0" fontAlgn="t">
+                        <a:spcBef>
+                          <a:spcPts val="0"/>
+                        </a:spcBef>
+                        <a:spcAft>
+                          <a:spcPts val="0"/>
+                        </a:spcAft>
+                      </a:pPr>
+                      <a:r>
+                        <a:rPr lang="en-US" sz="1800" b="1">
                           <a:effectLst/>
                           <a:latin typeface="Calibri" panose="020F0502020204030204" pitchFamily="34" charset="0"/>
                         </a:rPr>
                         <a:t>Friday</a:t>
                       </a:r>
-                      <a:endParaRPr lang="en-US" sz="1800" dirty="0">
+                      <a:endParaRPr lang="en-US" sz="1800">
                         <a:effectLst/>
                         <a:latin typeface="Calibri" panose="020F0502020204030204" pitchFamily="34" charset="0"/>
                       </a:endParaRPr>
@@ -11083,13 +11183,13 @@
                         <a:buNone/>
                       </a:pPr>
                       <a:r>
-                        <a:rPr lang="en-US" sz="1600" dirty="0">
+                        <a:rPr lang="en-US" sz="1600">
                           <a:effectLst/>
                           <a:latin typeface="Calibri" panose="020F0502020204030204" pitchFamily="34" charset="0"/>
                         </a:rPr>
-                        <a:t>Lab Prep Posted</a:t>
+                        <a:t>Lab Explained, Part A due</a:t>
                       </a:r>
-                      <a:endParaRPr lang="en-US" sz="1800" dirty="0">
+                      <a:endParaRPr lang="en-US" sz="1800">
                         <a:effectLst/>
                       </a:endParaRPr>
                     </a:p>
@@ -11150,13 +11250,13 @@
                         <a:buNone/>
                       </a:pPr>
                       <a:r>
-                        <a:rPr lang="en-US" sz="1600" dirty="0">
+                        <a:rPr lang="en-US" sz="1600">
                           <a:effectLst/>
                           <a:latin typeface="Calibri" panose="020F0502020204030204" pitchFamily="34" charset="0"/>
                         </a:rPr>
-                        <a:t>Lab Problem Part 1 due</a:t>
+                        <a:t>Lab help on part B (and projects)</a:t>
                       </a:r>
-                      <a:endParaRPr lang="en-US" sz="1800" dirty="0">
+                      <a:endParaRPr lang="en-US" sz="1800">
                         <a:effectLst/>
                       </a:endParaRPr>
                     </a:p>
@@ -11217,13 +11317,13 @@
                         <a:buNone/>
                       </a:pPr>
                       <a:r>
-                        <a:rPr lang="en-US" sz="1600" dirty="0">
+                        <a:rPr lang="en-US" sz="1600">
                           <a:effectLst/>
                           <a:latin typeface="Calibri" panose="020F0502020204030204" pitchFamily="34" charset="0"/>
                         </a:rPr>
-                        <a:t>Lab Problem Part 2 due</a:t>
+                        <a:t>Lab part B due</a:t>
                       </a:r>
-                      <a:endParaRPr lang="en-US" sz="1800" dirty="0">
+                      <a:endParaRPr lang="en-US" sz="1800">
                         <a:effectLst/>
                       </a:endParaRPr>
                     </a:p>
@@ -11284,27 +11384,27 @@
                         <a:buNone/>
                       </a:pPr>
                       <a:r>
-                        <a:rPr lang="en-US" sz="1600" dirty="0">
+                        <a:rPr lang="en-US" sz="1600">
                           <a:effectLst/>
                           <a:latin typeface="Calibri" panose="020F0502020204030204" pitchFamily="34" charset="0"/>
                         </a:rPr>
                         <a:t>New </a:t>
                       </a:r>
                       <a:r>
-                        <a:rPr lang="en-US" sz="1600" dirty="0" err="1">
+                        <a:rPr lang="en-US" sz="1600" err="1">
                           <a:effectLst/>
                           <a:latin typeface="Calibri" panose="020F0502020204030204" pitchFamily="34" charset="0"/>
                         </a:rPr>
                         <a:t>Zybooks</a:t>
                       </a:r>
                       <a:r>
-                        <a:rPr lang="en-US" sz="1600" dirty="0">
+                        <a:rPr lang="en-US" sz="1600">
                           <a:effectLst/>
                           <a:latin typeface="Calibri" panose="020F0502020204030204" pitchFamily="34" charset="0"/>
                         </a:rPr>
                         <a:t> homework posted</a:t>
                       </a:r>
-                      <a:endParaRPr lang="en-US" sz="1800" dirty="0">
+                      <a:endParaRPr lang="en-US" sz="1800">
                         <a:effectLst/>
                       </a:endParaRPr>
                     </a:p>
@@ -11320,27 +11420,27 @@
                         <a:buNone/>
                       </a:pPr>
                       <a:r>
-                        <a:rPr lang="en-US" sz="1600" dirty="0">
+                        <a:rPr lang="en-US" sz="1600">
                           <a:effectLst/>
                           <a:latin typeface="Calibri" panose="020F0502020204030204" pitchFamily="34" charset="0"/>
                         </a:rPr>
                         <a:t>Previous </a:t>
                       </a:r>
                       <a:r>
-                        <a:rPr lang="en-US" sz="1600" dirty="0" err="1">
+                        <a:rPr lang="en-US" sz="1600" err="1">
                           <a:effectLst/>
                           <a:latin typeface="Calibri" panose="020F0502020204030204" pitchFamily="34" charset="0"/>
                         </a:rPr>
                         <a:t>Zybooks</a:t>
                       </a:r>
                       <a:r>
-                        <a:rPr lang="en-US" sz="1600" dirty="0">
+                        <a:rPr lang="en-US" sz="1600">
                           <a:effectLst/>
                           <a:latin typeface="Calibri" panose="020F0502020204030204" pitchFamily="34" charset="0"/>
                         </a:rPr>
                         <a:t> homework due</a:t>
                       </a:r>
-                      <a:endParaRPr lang="en-US" sz="1800" dirty="0">
+                      <a:endParaRPr lang="en-US" sz="1800">
                         <a:effectLst/>
                       </a:endParaRPr>
                     </a:p>
@@ -11356,13 +11456,13 @@
                         <a:buNone/>
                       </a:pPr>
                       <a:r>
-                        <a:rPr lang="en-US" sz="1600" dirty="0">
+                        <a:rPr lang="en-US" sz="1600">
                           <a:effectLst/>
                           <a:latin typeface="Calibri" panose="020F0502020204030204" pitchFamily="34" charset="0"/>
                         </a:rPr>
                         <a:t>Weekly Quiz</a:t>
                       </a:r>
-                      <a:endParaRPr lang="en-US" sz="1800" dirty="0">
+                      <a:endParaRPr lang="en-US" sz="1800">
                         <a:effectLst/>
                       </a:endParaRPr>
                     </a:p>
@@ -12442,59 +12542,6 @@
 </file>
 
 <file path=customXml/item1.xml><?xml version="1.0" encoding="utf-8"?>
-<p:properties xmlns:p="http://schemas.microsoft.com/office/2006/metadata/properties" xmlns:xsi="http://www.w3.org/2001/XMLSchema-instance" xmlns:pc="http://schemas.microsoft.com/office/infopath/2007/PartnerControls">
-  <documentManagement>
-    <Invited_Students xmlns="ec914106-4023-4d62-800a-0989b013d7ae" xsi:nil="true"/>
-    <TeamsChannelId xmlns="ec914106-4023-4d62-800a-0989b013d7ae" xsi:nil="true"/>
-    <DefaultSectionNames xmlns="ec914106-4023-4d62-800a-0989b013d7ae" xsi:nil="true"/>
-    <Self_Registration_Enabled xmlns="ec914106-4023-4d62-800a-0989b013d7ae" xsi:nil="true"/>
-    <CultureName xmlns="ec914106-4023-4d62-800a-0989b013d7ae" xsi:nil="true"/>
-    <Student_Groups xmlns="ec914106-4023-4d62-800a-0989b013d7ae">
-      <UserInfo>
-        <DisplayName/>
-        <AccountId xsi:nil="true"/>
-        <AccountType/>
-      </UserInfo>
-    </Student_Groups>
-    <Has_Teacher_Only_SectionGroup xmlns="ec914106-4023-4d62-800a-0989b013d7ae" xsi:nil="true"/>
-    <AppVersion xmlns="ec914106-4023-4d62-800a-0989b013d7ae" xsi:nil="true"/>
-    <Teams_Channel_Section_Location xmlns="ec914106-4023-4d62-800a-0989b013d7ae" xsi:nil="true"/>
-    <Math_Settings xmlns="ec914106-4023-4d62-800a-0989b013d7ae" xsi:nil="true"/>
-    <Owner xmlns="ec914106-4023-4d62-800a-0989b013d7ae">
-      <UserInfo>
-        <DisplayName/>
-        <AccountId xsi:nil="true"/>
-        <AccountType/>
-      </UserInfo>
-    </Owner>
-    <Invited_Teachers xmlns="ec914106-4023-4d62-800a-0989b013d7ae" xsi:nil="true"/>
-    <IsNotebookLocked xmlns="ec914106-4023-4d62-800a-0989b013d7ae" xsi:nil="true"/>
-    <Is_Collaboration_Space_Locked xmlns="ec914106-4023-4d62-800a-0989b013d7ae" xsi:nil="true"/>
-    <_activity xmlns="ec914106-4023-4d62-800a-0989b013d7ae" xsi:nil="true"/>
-    <Templates xmlns="ec914106-4023-4d62-800a-0989b013d7ae" xsi:nil="true"/>
-    <NotebookType xmlns="ec914106-4023-4d62-800a-0989b013d7ae" xsi:nil="true"/>
-    <Distribution_Groups xmlns="ec914106-4023-4d62-800a-0989b013d7ae" xsi:nil="true"/>
-    <LMS_Mappings xmlns="ec914106-4023-4d62-800a-0989b013d7ae" xsi:nil="true"/>
-    <FolderType xmlns="ec914106-4023-4d62-800a-0989b013d7ae" xsi:nil="true"/>
-    <Teachers xmlns="ec914106-4023-4d62-800a-0989b013d7ae">
-      <UserInfo>
-        <DisplayName/>
-        <AccountId xsi:nil="true"/>
-        <AccountType/>
-      </UserInfo>
-    </Teachers>
-    <Students xmlns="ec914106-4023-4d62-800a-0989b013d7ae">
-      <UserInfo>
-        <DisplayName/>
-        <AccountId xsi:nil="true"/>
-        <AccountType/>
-      </UserInfo>
-    </Students>
-  </documentManagement>
-</p:properties>
-</file>
-
-<file path=customXml/item2.xml><?xml version="1.0" encoding="utf-8"?>
 <?mso-contentType ?>
 <FormTemplates xmlns="http://schemas.microsoft.com/sharepoint/v3/contenttype/forms">
   <Display>DocumentLibraryForm</Display>
@@ -12503,7 +12550,7 @@
 </FormTemplates>
 </file>
 
-<file path=customXml/item3.xml><?xml version="1.0" encoding="utf-8"?>
+<file path=customXml/item2.xml><?xml version="1.0" encoding="utf-8"?>
 <ct:contentTypeSchema xmlns:ct="http://schemas.microsoft.com/office/2006/metadata/contentType" xmlns:ma="http://schemas.microsoft.com/office/2006/metadata/properties/metaAttributes" ct:_="" ma:_="" ma:contentTypeName="Document" ma:contentTypeID="0x0101009BA8C64042A6704EA3EB4DC41C4FB05F" ma:contentTypeVersion="38" ma:contentTypeDescription="Create a new document." ma:contentTypeScope="" ma:versionID="bf4ae4a69332618c3e03d65c43393afd">
   <xsd:schema xmlns:xsd="http://www.w3.org/2001/XMLSchema" xmlns:xs="http://www.w3.org/2001/XMLSchema" xmlns:p="http://schemas.microsoft.com/office/2006/metadata/properties" xmlns:ns3="3b402ec5-cb89-4739-911d-5dd1c5e01384" xmlns:ns4="ec914106-4023-4d62-800a-0989b013d7ae" targetNamespace="http://schemas.microsoft.com/office/2006/metadata/properties" ma:root="true" ma:fieldsID="f0fe23496be744e10d46861378f316da" ns3:_="" ns4:_="">
     <xsd:import namespace="3b402ec5-cb89-4739-911d-5dd1c5e01384"/>
@@ -12944,24 +12991,60 @@
 </ct:contentTypeSchema>
 </file>
 
-<file path=customXml/itemProps1.xml><?xml version="1.0" encoding="utf-8"?>
-<ds:datastoreItem xmlns:ds="http://schemas.openxmlformats.org/officeDocument/2006/customXml" ds:itemID="{CDA71DE4-3AE9-478E-9111-978128D747CB}">
-  <ds:schemaRefs>
-    <ds:schemaRef ds:uri="http://www.w3.org/XML/1998/namespace"/>
-    <ds:schemaRef ds:uri="3b402ec5-cb89-4739-911d-5dd1c5e01384"/>
-    <ds:schemaRef ds:uri="http://schemas.microsoft.com/office/2006/metadata/properties"/>
-    <ds:schemaRef ds:uri="http://schemas.microsoft.com/office/2006/documentManagement/types"/>
-    <ds:schemaRef ds:uri="http://schemas.openxmlformats.org/package/2006/metadata/core-properties"/>
-    <ds:schemaRef ds:uri="http://purl.org/dc/dcmitype/"/>
-    <ds:schemaRef ds:uri="http://purl.org/dc/terms/"/>
-    <ds:schemaRef ds:uri="http://schemas.microsoft.com/office/infopath/2007/PartnerControls"/>
-    <ds:schemaRef ds:uri="ec914106-4023-4d62-800a-0989b013d7ae"/>
-    <ds:schemaRef ds:uri="http://purl.org/dc/elements/1.1/"/>
-  </ds:schemaRefs>
-</ds:datastoreItem>
+<file path=customXml/item3.xml><?xml version="1.0" encoding="utf-8"?>
+<p:properties xmlns:p="http://schemas.microsoft.com/office/2006/metadata/properties" xmlns:xsi="http://www.w3.org/2001/XMLSchema-instance" xmlns:pc="http://schemas.microsoft.com/office/infopath/2007/PartnerControls">
+  <documentManagement>
+    <Invited_Students xmlns="ec914106-4023-4d62-800a-0989b013d7ae" xsi:nil="true"/>
+    <TeamsChannelId xmlns="ec914106-4023-4d62-800a-0989b013d7ae" xsi:nil="true"/>
+    <DefaultSectionNames xmlns="ec914106-4023-4d62-800a-0989b013d7ae" xsi:nil="true"/>
+    <Self_Registration_Enabled xmlns="ec914106-4023-4d62-800a-0989b013d7ae" xsi:nil="true"/>
+    <CultureName xmlns="ec914106-4023-4d62-800a-0989b013d7ae" xsi:nil="true"/>
+    <Student_Groups xmlns="ec914106-4023-4d62-800a-0989b013d7ae">
+      <UserInfo>
+        <DisplayName/>
+        <AccountId xsi:nil="true"/>
+        <AccountType/>
+      </UserInfo>
+    </Student_Groups>
+    <Has_Teacher_Only_SectionGroup xmlns="ec914106-4023-4d62-800a-0989b013d7ae" xsi:nil="true"/>
+    <AppVersion xmlns="ec914106-4023-4d62-800a-0989b013d7ae" xsi:nil="true"/>
+    <Teams_Channel_Section_Location xmlns="ec914106-4023-4d62-800a-0989b013d7ae" xsi:nil="true"/>
+    <Math_Settings xmlns="ec914106-4023-4d62-800a-0989b013d7ae" xsi:nil="true"/>
+    <Owner xmlns="ec914106-4023-4d62-800a-0989b013d7ae">
+      <UserInfo>
+        <DisplayName/>
+        <AccountId xsi:nil="true"/>
+        <AccountType/>
+      </UserInfo>
+    </Owner>
+    <Invited_Teachers xmlns="ec914106-4023-4d62-800a-0989b013d7ae" xsi:nil="true"/>
+    <IsNotebookLocked xmlns="ec914106-4023-4d62-800a-0989b013d7ae" xsi:nil="true"/>
+    <Is_Collaboration_Space_Locked xmlns="ec914106-4023-4d62-800a-0989b013d7ae" xsi:nil="true"/>
+    <_activity xmlns="ec914106-4023-4d62-800a-0989b013d7ae" xsi:nil="true"/>
+    <Templates xmlns="ec914106-4023-4d62-800a-0989b013d7ae" xsi:nil="true"/>
+    <NotebookType xmlns="ec914106-4023-4d62-800a-0989b013d7ae" xsi:nil="true"/>
+    <Distribution_Groups xmlns="ec914106-4023-4d62-800a-0989b013d7ae" xsi:nil="true"/>
+    <LMS_Mappings xmlns="ec914106-4023-4d62-800a-0989b013d7ae" xsi:nil="true"/>
+    <FolderType xmlns="ec914106-4023-4d62-800a-0989b013d7ae" xsi:nil="true"/>
+    <Teachers xmlns="ec914106-4023-4d62-800a-0989b013d7ae">
+      <UserInfo>
+        <DisplayName/>
+        <AccountId xsi:nil="true"/>
+        <AccountType/>
+      </UserInfo>
+    </Teachers>
+    <Students xmlns="ec914106-4023-4d62-800a-0989b013d7ae">
+      <UserInfo>
+        <DisplayName/>
+        <AccountId xsi:nil="true"/>
+        <AccountType/>
+      </UserInfo>
+    </Students>
+  </documentManagement>
+</p:properties>
 </file>
 
-<file path=customXml/itemProps2.xml><?xml version="1.0" encoding="utf-8"?>
+<file path=customXml/itemProps1.xml><?xml version="1.0" encoding="utf-8"?>
 <ds:datastoreItem xmlns:ds="http://schemas.openxmlformats.org/officeDocument/2006/customXml" ds:itemID="{EB197284-9703-44A9-BDA7-BAABB0FFB9E9}">
   <ds:schemaRefs>
     <ds:schemaRef ds:uri="http://schemas.microsoft.com/sharepoint/v3/contenttype/forms"/>
@@ -12969,21 +13052,38 @@
 </ds:datastoreItem>
 </file>
 
-<file path=customXml/itemProps3.xml><?xml version="1.0" encoding="utf-8"?>
+<file path=customXml/itemProps2.xml><?xml version="1.0" encoding="utf-8"?>
 <ds:datastoreItem xmlns:ds="http://schemas.openxmlformats.org/officeDocument/2006/customXml" ds:itemID="{BCEFC554-2353-41F4-B9DE-4E354DBABA5E}">
   <ds:schemaRefs>
-    <ds:schemaRef ds:uri="http://schemas.microsoft.com/office/2006/metadata/contentType"/>
-    <ds:schemaRef ds:uri="http://schemas.microsoft.com/office/2006/metadata/properties/metaAttributes"/>
-    <ds:schemaRef ds:uri="http://www.w3.org/2001/XMLSchema"/>
-    <ds:schemaRef ds:uri="http://schemas.microsoft.com/office/2006/metadata/properties"/>
     <ds:schemaRef ds:uri="3b402ec5-cb89-4739-911d-5dd1c5e01384"/>
     <ds:schemaRef ds:uri="ec914106-4023-4d62-800a-0989b013d7ae"/>
-    <ds:schemaRef ds:uri="http://schemas.microsoft.com/office/2006/documentManagement/types"/>
-    <ds:schemaRef ds:uri="http://schemas.microsoft.com/office/infopath/2007/PartnerControls"/>
-    <ds:schemaRef ds:uri="http://schemas.openxmlformats.org/package/2006/metadata/core-properties"/>
     <ds:schemaRef ds:uri="http://purl.org/dc/elements/1.1/"/>
     <ds:schemaRef ds:uri="http://purl.org/dc/terms/"/>
     <ds:schemaRef ds:uri="http://schemas.microsoft.com/internal/obd"/>
+    <ds:schemaRef ds:uri="http://schemas.microsoft.com/office/2006/documentManagement/types"/>
+    <ds:schemaRef ds:uri="http://schemas.microsoft.com/office/2006/metadata/contentType"/>
+    <ds:schemaRef ds:uri="http://schemas.microsoft.com/office/2006/metadata/properties"/>
+    <ds:schemaRef ds:uri="http://schemas.microsoft.com/office/2006/metadata/properties/metaAttributes"/>
+    <ds:schemaRef ds:uri="http://schemas.microsoft.com/office/infopath/2007/PartnerControls"/>
+    <ds:schemaRef ds:uri="http://schemas.openxmlformats.org/package/2006/metadata/core-properties"/>
+    <ds:schemaRef ds:uri="http://www.w3.org/2001/XMLSchema"/>
+  </ds:schemaRefs>
+</ds:datastoreItem>
+</file>
+
+<file path=customXml/itemProps3.xml><?xml version="1.0" encoding="utf-8"?>
+<ds:datastoreItem xmlns:ds="http://schemas.openxmlformats.org/officeDocument/2006/customXml" ds:itemID="{CDA71DE4-3AE9-478E-9111-978128D747CB}">
+  <ds:schemaRefs>
+    <ds:schemaRef ds:uri="3b402ec5-cb89-4739-911d-5dd1c5e01384"/>
+    <ds:schemaRef ds:uri="ec914106-4023-4d62-800a-0989b013d7ae"/>
+    <ds:schemaRef ds:uri="http://purl.org/dc/dcmitype/"/>
+    <ds:schemaRef ds:uri="http://purl.org/dc/elements/1.1/"/>
+    <ds:schemaRef ds:uri="http://purl.org/dc/terms/"/>
+    <ds:schemaRef ds:uri="http://schemas.microsoft.com/office/2006/documentManagement/types"/>
+    <ds:schemaRef ds:uri="http://schemas.microsoft.com/office/2006/metadata/properties"/>
+    <ds:schemaRef ds:uri="http://schemas.microsoft.com/office/infopath/2007/PartnerControls"/>
+    <ds:schemaRef ds:uri="http://schemas.openxmlformats.org/package/2006/metadata/core-properties"/>
+    <ds:schemaRef ds:uri="http://www.w3.org/XML/1998/namespace"/>
   </ds:schemaRefs>
 </ds:datastoreItem>
 </file>
</xml_diff>